<commit_message>
Updated SQL Injection PPT
</commit_message>
<xml_diff>
--- a/presentations/9-15-16_GreyHat_SQL_Injection.pptx
+++ b/presentations/9-15-16_GreyHat_SQL_Injection.pptx
@@ -5,32 +5,34 @@
     <p:sldMasterId id="2147483648" r:id="rId1"/>
   </p:sldMasterIdLst>
   <p:notesMasterIdLst>
-    <p:notesMasterId r:id="rId25"/>
+    <p:notesMasterId r:id="rId27"/>
   </p:notesMasterIdLst>
   <p:sldIdLst>
     <p:sldId id="256" r:id="rId2"/>
-    <p:sldId id="269" r:id="rId3"/>
-    <p:sldId id="257" r:id="rId4"/>
-    <p:sldId id="258" r:id="rId5"/>
-    <p:sldId id="259" r:id="rId6"/>
-    <p:sldId id="260" r:id="rId7"/>
-    <p:sldId id="263" r:id="rId8"/>
-    <p:sldId id="261" r:id="rId9"/>
-    <p:sldId id="264" r:id="rId10"/>
-    <p:sldId id="262" r:id="rId11"/>
-    <p:sldId id="265" r:id="rId12"/>
-    <p:sldId id="266" r:id="rId13"/>
-    <p:sldId id="267" r:id="rId14"/>
-    <p:sldId id="271" r:id="rId15"/>
-    <p:sldId id="272" r:id="rId16"/>
-    <p:sldId id="268" r:id="rId17"/>
-    <p:sldId id="273" r:id="rId18"/>
-    <p:sldId id="275" r:id="rId19"/>
-    <p:sldId id="270" r:id="rId20"/>
-    <p:sldId id="278" r:id="rId21"/>
-    <p:sldId id="274" r:id="rId22"/>
-    <p:sldId id="276" r:id="rId23"/>
-    <p:sldId id="277" r:id="rId24"/>
+    <p:sldId id="279" r:id="rId3"/>
+    <p:sldId id="280" r:id="rId4"/>
+    <p:sldId id="269" r:id="rId5"/>
+    <p:sldId id="257" r:id="rId6"/>
+    <p:sldId id="258" r:id="rId7"/>
+    <p:sldId id="259" r:id="rId8"/>
+    <p:sldId id="260" r:id="rId9"/>
+    <p:sldId id="263" r:id="rId10"/>
+    <p:sldId id="261" r:id="rId11"/>
+    <p:sldId id="264" r:id="rId12"/>
+    <p:sldId id="262" r:id="rId13"/>
+    <p:sldId id="265" r:id="rId14"/>
+    <p:sldId id="266" r:id="rId15"/>
+    <p:sldId id="267" r:id="rId16"/>
+    <p:sldId id="271" r:id="rId17"/>
+    <p:sldId id="272" r:id="rId18"/>
+    <p:sldId id="268" r:id="rId19"/>
+    <p:sldId id="273" r:id="rId20"/>
+    <p:sldId id="275" r:id="rId21"/>
+    <p:sldId id="270" r:id="rId22"/>
+    <p:sldId id="278" r:id="rId23"/>
+    <p:sldId id="274" r:id="rId24"/>
+    <p:sldId id="276" r:id="rId25"/>
+    <p:sldId id="277" r:id="rId26"/>
   </p:sldIdLst>
   <p:sldSz cx="12192000" cy="6858000"/>
   <p:notesSz cx="6858000" cy="9144000"/>
@@ -219,7 +221,7 @@
           <a:p>
             <a:fld id="{05B5379F-3DD3-451D-A018-85B7E5E318F6}" type="datetimeFigureOut">
               <a:rPr lang="en-US" smtClean="0"/>
-              <a:t>8/27/2016</a:t>
+              <a:t>9/15/2016</a:t>
             </a:fld>
             <a:endParaRPr lang="en-US"/>
           </a:p>
@@ -532,23 +534,11 @@
           <a:p>
             <a:r>
               <a:rPr lang="en-US" dirty="0"/>
-              <a:t>Simple –</a:t>
+              <a:t>MySQL Inject a path into malicious library into wrapper file used by many MySQL</a:t>
             </a:r>
             <a:r>
               <a:rPr lang="en-US" baseline="0" dirty="0"/>
-              <a:t> We’ll see in a bit</a:t>
-            </a:r>
-          </a:p>
-          <a:p>
-            <a:r>
-              <a:rPr lang="en-US" baseline="0" dirty="0"/>
-              <a:t>Error Based – Look at error messages that leak implementation details about database</a:t>
-            </a:r>
-          </a:p>
-          <a:p>
-            <a:r>
-              <a:rPr lang="en-US" baseline="0" dirty="0"/>
-              <a:t>Blind – Generic error message</a:t>
+              <a:t> packages</a:t>
             </a:r>
             <a:endParaRPr lang="en-US" dirty="0"/>
           </a:p>
@@ -571,7 +561,7 @@
           <a:p>
             <a:fld id="{56B7243C-671F-48EC-8863-87A08C87F3F9}" type="slidenum">
               <a:rPr lang="en-US" smtClean="0"/>
-              <a:t>2</a:t>
+              <a:t>3</a:t>
             </a:fld>
             <a:endParaRPr lang="en-US"/>
           </a:p>
@@ -580,7 +570,91 @@
     </p:spTree>
     <p:extLst>
       <p:ext uri="{BB962C8B-B14F-4D97-AF65-F5344CB8AC3E}">
-        <p14:creationId xmlns:p14="http://schemas.microsoft.com/office/powerpoint/2010/main" val="1156590258"/>
+        <p14:creationId xmlns:p14="http://schemas.microsoft.com/office/powerpoint/2010/main" val="3418112258"/>
+      </p:ext>
+    </p:extLst>
+  </p:cSld>
+  <p:clrMapOvr>
+    <a:masterClrMapping/>
+  </p:clrMapOvr>
+</p:notes>
+</file>
+
+<file path=ppt/notesSlides/notesSlide10.xml><?xml version="1.0" encoding="utf-8"?>
+<p:notes xmlns:a="http://schemas.openxmlformats.org/drawingml/2006/main" xmlns:r="http://schemas.openxmlformats.org/officeDocument/2006/relationships" xmlns:p="http://schemas.openxmlformats.org/presentationml/2006/main">
+  <p:cSld>
+    <p:spTree>
+      <p:nvGrpSpPr>
+        <p:cNvPr id="1" name=""/>
+        <p:cNvGrpSpPr/>
+        <p:nvPr/>
+      </p:nvGrpSpPr>
+      <p:grpSpPr>
+        <a:xfrm>
+          <a:off x="0" y="0"/>
+          <a:ext cx="0" cy="0"/>
+          <a:chOff x="0" y="0"/>
+          <a:chExt cx="0" cy="0"/>
+        </a:xfrm>
+      </p:grpSpPr>
+      <p:sp>
+        <p:nvSpPr>
+          <p:cNvPr id="2" name="Slide Image Placeholder 1"/>
+          <p:cNvSpPr>
+            <a:spLocks noGrp="1" noRot="1" noChangeAspect="1"/>
+          </p:cNvSpPr>
+          <p:nvPr>
+            <p:ph type="sldImg"/>
+          </p:nvPr>
+        </p:nvSpPr>
+        <p:spPr/>
+      </p:sp>
+      <p:sp>
+        <p:nvSpPr>
+          <p:cNvPr id="3" name="Notes Placeholder 2"/>
+          <p:cNvSpPr>
+            <a:spLocks noGrp="1"/>
+          </p:cNvSpPr>
+          <p:nvPr>
+            <p:ph type="body" idx="1"/>
+          </p:nvPr>
+        </p:nvSpPr>
+        <p:spPr/>
+        <p:txBody>
+          <a:bodyPr/>
+          <a:lstStyle/>
+          <a:p>
+            <a:endParaRPr lang="en-US" dirty="0"/>
+          </a:p>
+        </p:txBody>
+      </p:sp>
+      <p:sp>
+        <p:nvSpPr>
+          <p:cNvPr id="4" name="Slide Number Placeholder 3"/>
+          <p:cNvSpPr>
+            <a:spLocks noGrp="1"/>
+          </p:cNvSpPr>
+          <p:nvPr>
+            <p:ph type="sldNum" sz="quarter" idx="10"/>
+          </p:nvPr>
+        </p:nvSpPr>
+        <p:spPr/>
+        <p:txBody>
+          <a:bodyPr/>
+          <a:lstStyle/>
+          <a:p>
+            <a:fld id="{56B7243C-671F-48EC-8863-87A08C87F3F9}" type="slidenum">
+              <a:rPr lang="en-US" smtClean="0"/>
+              <a:t>20</a:t>
+            </a:fld>
+            <a:endParaRPr lang="en-US"/>
+          </a:p>
+        </p:txBody>
+      </p:sp>
+    </p:spTree>
+    <p:extLst>
+      <p:ext uri="{BB962C8B-B14F-4D97-AF65-F5344CB8AC3E}">
+        <p14:creationId xmlns:p14="http://schemas.microsoft.com/office/powerpoint/2010/main" val="4115708187"/>
       </p:ext>
     </p:extLst>
   </p:cSld>
@@ -636,23 +710,23 @@
           <a:p>
             <a:r>
               <a:rPr lang="en-US" dirty="0"/>
-              <a:t>OWASP – non profit</a:t>
+              <a:t>Simple –</a:t>
             </a:r>
             <a:r>
               <a:rPr lang="en-US" baseline="0" dirty="0"/>
-              <a:t> focused on improving security of software worldwide.</a:t>
+              <a:t> We’ll see in a bit</a:t>
             </a:r>
           </a:p>
           <a:p>
             <a:r>
               <a:rPr lang="en-US" baseline="0" dirty="0"/>
-              <a:t>Best Practices</a:t>
+              <a:t>Error Based – Look at error messages that leak implementation details about database</a:t>
             </a:r>
           </a:p>
           <a:p>
             <a:r>
               <a:rPr lang="en-US" baseline="0" dirty="0"/>
-              <a:t>All the materials are free, books, etc.</a:t>
+              <a:t>Blind – Generic error message</a:t>
             </a:r>
             <a:endParaRPr lang="en-US" dirty="0"/>
           </a:p>
@@ -675,7 +749,7 @@
           <a:p>
             <a:fld id="{56B7243C-671F-48EC-8863-87A08C87F3F9}" type="slidenum">
               <a:rPr lang="en-US" smtClean="0"/>
-              <a:t>3</a:t>
+              <a:t>4</a:t>
             </a:fld>
             <a:endParaRPr lang="en-US"/>
           </a:p>
@@ -684,7 +758,7 @@
     </p:spTree>
     <p:extLst>
       <p:ext uri="{BB962C8B-B14F-4D97-AF65-F5344CB8AC3E}">
-        <p14:creationId xmlns:p14="http://schemas.microsoft.com/office/powerpoint/2010/main" val="3183102363"/>
+        <p14:creationId xmlns:p14="http://schemas.microsoft.com/office/powerpoint/2010/main" val="1156590258"/>
       </p:ext>
     </p:extLst>
   </p:cSld>
@@ -740,17 +814,23 @@
           <a:p>
             <a:r>
               <a:rPr lang="en-US" dirty="0"/>
-              <a:t>User</a:t>
+              <a:t>OWASP – non profit</a:t>
             </a:r>
             <a:r>
               <a:rPr lang="en-US" baseline="0" dirty="0"/>
-              <a:t> input is evaluated directly without any preprocessing</a:t>
+              <a:t> focused on improving security of software worldwide.</a:t>
             </a:r>
           </a:p>
           <a:p>
             <a:r>
               <a:rPr lang="en-US" baseline="0" dirty="0"/>
-              <a:t>To remove special characters and such</a:t>
+              <a:t>Best Practices</a:t>
+            </a:r>
+          </a:p>
+          <a:p>
+            <a:r>
+              <a:rPr lang="en-US" baseline="0" dirty="0"/>
+              <a:t>All the materials are free, books, etc.</a:t>
             </a:r>
             <a:endParaRPr lang="en-US" dirty="0"/>
           </a:p>
@@ -773,7 +853,7 @@
           <a:p>
             <a:fld id="{56B7243C-671F-48EC-8863-87A08C87F3F9}" type="slidenum">
               <a:rPr lang="en-US" smtClean="0"/>
-              <a:t>10</a:t>
+              <a:t>5</a:t>
             </a:fld>
             <a:endParaRPr lang="en-US"/>
           </a:p>
@@ -782,7 +862,7 @@
     </p:spTree>
     <p:extLst>
       <p:ext uri="{BB962C8B-B14F-4D97-AF65-F5344CB8AC3E}">
-        <p14:creationId xmlns:p14="http://schemas.microsoft.com/office/powerpoint/2010/main" val="2718314508"/>
+        <p14:creationId xmlns:p14="http://schemas.microsoft.com/office/powerpoint/2010/main" val="3183102363"/>
       </p:ext>
     </p:extLst>
   </p:cSld>
@@ -838,17 +918,17 @@
           <a:p>
             <a:r>
               <a:rPr lang="en-US" dirty="0"/>
-              <a:t>If</a:t>
+              <a:t>User</a:t>
             </a:r>
             <a:r>
               <a:rPr lang="en-US" baseline="0" dirty="0"/>
-              <a:t> you’re being astute – not really true.</a:t>
+              <a:t> input is evaluated directly without any preprocessing</a:t>
             </a:r>
           </a:p>
           <a:p>
             <a:r>
               <a:rPr lang="en-US" baseline="0" dirty="0"/>
-              <a:t>What am I doing with the password field, and why?</a:t>
+              <a:t>To remove special characters and such</a:t>
             </a:r>
             <a:endParaRPr lang="en-US" dirty="0"/>
           </a:p>
@@ -871,7 +951,7 @@
           <a:p>
             <a:fld id="{56B7243C-671F-48EC-8863-87A08C87F3F9}" type="slidenum">
               <a:rPr lang="en-US" smtClean="0"/>
-              <a:t>11</a:t>
+              <a:t>12</a:t>
             </a:fld>
             <a:endParaRPr lang="en-US"/>
           </a:p>
@@ -880,7 +960,7 @@
     </p:spTree>
     <p:extLst>
       <p:ext uri="{BB962C8B-B14F-4D97-AF65-F5344CB8AC3E}">
-        <p14:creationId xmlns:p14="http://schemas.microsoft.com/office/powerpoint/2010/main" val="3863150947"/>
+        <p14:creationId xmlns:p14="http://schemas.microsoft.com/office/powerpoint/2010/main" val="2718314508"/>
       </p:ext>
     </p:extLst>
   </p:cSld>
@@ -936,10 +1016,18 @@
           <a:p>
             <a:r>
               <a:rPr lang="en-US" dirty="0"/>
-              <a:t>Attention – why did I put the two dashes?</a:t>
-            </a:r>
-          </a:p>
-          <a:p>
+              <a:t>If</a:t>
+            </a:r>
+            <a:r>
+              <a:rPr lang="en-US" baseline="0" dirty="0"/>
+              <a:t> you’re being astute – not really true.</a:t>
+            </a:r>
+          </a:p>
+          <a:p>
+            <a:r>
+              <a:rPr lang="en-US" baseline="0" dirty="0"/>
+              <a:t>What am I doing with the password field, and why?</a:t>
+            </a:r>
             <a:endParaRPr lang="en-US" dirty="0"/>
           </a:p>
         </p:txBody>
@@ -961,7 +1049,7 @@
           <a:p>
             <a:fld id="{56B7243C-671F-48EC-8863-87A08C87F3F9}" type="slidenum">
               <a:rPr lang="en-US" smtClean="0"/>
-              <a:t>12</a:t>
+              <a:t>13</a:t>
             </a:fld>
             <a:endParaRPr lang="en-US"/>
           </a:p>
@@ -970,7 +1058,7 @@
     </p:spTree>
     <p:extLst>
       <p:ext uri="{BB962C8B-B14F-4D97-AF65-F5344CB8AC3E}">
-        <p14:creationId xmlns:p14="http://schemas.microsoft.com/office/powerpoint/2010/main" val="1985603126"/>
+        <p14:creationId xmlns:p14="http://schemas.microsoft.com/office/powerpoint/2010/main" val="3863150947"/>
       </p:ext>
     </p:extLst>
   </p:cSld>
@@ -1026,25 +1114,10 @@
           <a:p>
             <a:r>
               <a:rPr lang="en-US" dirty="0"/>
-              <a:t>If you came to CTF practice last year this will look familiar</a:t>
-            </a:r>
-          </a:p>
-          <a:p>
-            <a:r>
-              <a:rPr lang="en-US" dirty="0"/>
-              <a:t>Simple, textbook SQL</a:t>
-            </a:r>
-            <a:r>
-              <a:rPr lang="en-US" baseline="0" dirty="0"/>
-              <a:t> injection – make a statement that evaluates to TRUE for every row</a:t>
-            </a:r>
-            <a:endParaRPr lang="en-US" dirty="0"/>
-          </a:p>
-          <a:p>
-            <a:r>
-              <a:rPr lang="en-US" baseline="0" dirty="0"/>
-              <a:t>Side Note: This is why we always store password hashes!</a:t>
-            </a:r>
+              <a:t>Attention – why did I put the two dashes?</a:t>
+            </a:r>
+          </a:p>
+          <a:p>
             <a:endParaRPr lang="en-US" dirty="0"/>
           </a:p>
         </p:txBody>
@@ -1066,7 +1139,7 @@
           <a:p>
             <a:fld id="{56B7243C-671F-48EC-8863-87A08C87F3F9}" type="slidenum">
               <a:rPr lang="en-US" smtClean="0"/>
-              <a:t>13</a:t>
+              <a:t>14</a:t>
             </a:fld>
             <a:endParaRPr lang="en-US"/>
           </a:p>
@@ -1075,7 +1148,7 @@
     </p:spTree>
     <p:extLst>
       <p:ext uri="{BB962C8B-B14F-4D97-AF65-F5344CB8AC3E}">
-        <p14:creationId xmlns:p14="http://schemas.microsoft.com/office/powerpoint/2010/main" val="203040498"/>
+        <p14:creationId xmlns:p14="http://schemas.microsoft.com/office/powerpoint/2010/main" val="1985603126"/>
       </p:ext>
     </p:extLst>
   </p:cSld>
@@ -1131,17 +1204,24 @@
           <a:p>
             <a:r>
               <a:rPr lang="en-US" dirty="0"/>
-              <a:t>Before, we guessed</a:t>
+              <a:t>If you came to CTF practice last year this will look familiar</a:t>
+            </a:r>
+          </a:p>
+          <a:p>
+            <a:r>
+              <a:rPr lang="en-US" dirty="0"/>
+              <a:t>Simple, textbook SQL</a:t>
             </a:r>
             <a:r>
               <a:rPr lang="en-US" baseline="0" dirty="0"/>
-              <a:t> at the table names. Now, we have the server giving it all up to us by default.</a:t>
-            </a:r>
+              <a:t> injection – make a statement that evaluates to TRUE for every row</a:t>
+            </a:r>
+            <a:endParaRPr lang="en-US" dirty="0"/>
           </a:p>
           <a:p>
             <a:r>
               <a:rPr lang="en-US" baseline="0" dirty="0"/>
-              <a:t>Won’t go into details of it but just know that error based SQL injection is a simple task.</a:t>
+              <a:t>Side Note: This is why we always store password hashes!</a:t>
             </a:r>
             <a:endParaRPr lang="en-US" dirty="0"/>
           </a:p>
@@ -1164,7 +1244,7 @@
           <a:p>
             <a:fld id="{56B7243C-671F-48EC-8863-87A08C87F3F9}" type="slidenum">
               <a:rPr lang="en-US" smtClean="0"/>
-              <a:t>14</a:t>
+              <a:t>15</a:t>
             </a:fld>
             <a:endParaRPr lang="en-US"/>
           </a:p>
@@ -1173,7 +1253,7 @@
     </p:spTree>
     <p:extLst>
       <p:ext uri="{BB962C8B-B14F-4D97-AF65-F5344CB8AC3E}">
-        <p14:creationId xmlns:p14="http://schemas.microsoft.com/office/powerpoint/2010/main" val="3697427944"/>
+        <p14:creationId xmlns:p14="http://schemas.microsoft.com/office/powerpoint/2010/main" val="203040498"/>
       </p:ext>
     </p:extLst>
   </p:cSld>
@@ -1229,17 +1309,17 @@
           <a:p>
             <a:r>
               <a:rPr lang="en-US" dirty="0"/>
-              <a:t>~7 requests per character.</a:t>
-            </a:r>
-          </a:p>
-          <a:p>
-            <a:r>
-              <a:rPr lang="en-US" dirty="0"/>
-              <a:t>Using binary search character by character, an 8 letter</a:t>
+              <a:t>Before, we guessed</a:t>
             </a:r>
             <a:r>
               <a:rPr lang="en-US" baseline="0" dirty="0"/>
-              <a:t> username takes 56 requests.</a:t>
+              <a:t> at the table names. Now, we have the server giving it all up to us by default.</a:t>
+            </a:r>
+          </a:p>
+          <a:p>
+            <a:r>
+              <a:rPr lang="en-US" baseline="0" dirty="0"/>
+              <a:t>Won’t go into details of it but just know that error based SQL injection is a simple task.</a:t>
             </a:r>
             <a:endParaRPr lang="en-US" dirty="0"/>
           </a:p>
@@ -1271,7 +1351,7 @@
     </p:spTree>
     <p:extLst>
       <p:ext uri="{BB962C8B-B14F-4D97-AF65-F5344CB8AC3E}">
-        <p14:creationId xmlns:p14="http://schemas.microsoft.com/office/powerpoint/2010/main" val="3836328035"/>
+        <p14:creationId xmlns:p14="http://schemas.microsoft.com/office/powerpoint/2010/main" val="3697427944"/>
       </p:ext>
     </p:extLst>
   </p:cSld>
@@ -1325,6 +1405,20 @@
           <a:bodyPr/>
           <a:lstStyle/>
           <a:p>
+            <a:r>
+              <a:rPr lang="en-US" dirty="0"/>
+              <a:t>~7 requests per character.</a:t>
+            </a:r>
+          </a:p>
+          <a:p>
+            <a:r>
+              <a:rPr lang="en-US" dirty="0"/>
+              <a:t>Using binary search character by character, an 8 letter</a:t>
+            </a:r>
+            <a:r>
+              <a:rPr lang="en-US" baseline="0" dirty="0"/>
+              <a:t> username takes 56 requests.</a:t>
+            </a:r>
             <a:endParaRPr lang="en-US" dirty="0"/>
           </a:p>
         </p:txBody>
@@ -1355,7 +1449,7 @@
     </p:spTree>
     <p:extLst>
       <p:ext uri="{BB962C8B-B14F-4D97-AF65-F5344CB8AC3E}">
-        <p14:creationId xmlns:p14="http://schemas.microsoft.com/office/powerpoint/2010/main" val="4115708187"/>
+        <p14:creationId xmlns:p14="http://schemas.microsoft.com/office/powerpoint/2010/main" val="3836328035"/>
       </p:ext>
     </p:extLst>
   </p:cSld>
@@ -1611,7 +1705,7 @@
             <a:fld id="{B61BEF0D-F0BB-DE4B-95CE-6DB70DBA9567}" type="datetimeFigureOut">
               <a:rPr lang="en-US" dirty="0"/>
               <a:pPr/>
-              <a:t>8/27/2016</a:t>
+              <a:t>9/15/2016</a:t>
             </a:fld>
             <a:endParaRPr lang="en-US" dirty="0"/>
           </a:p>
@@ -1870,7 +1964,7 @@
             <a:fld id="{B61BEF0D-F0BB-DE4B-95CE-6DB70DBA9567}" type="datetimeFigureOut">
               <a:rPr lang="en-US" dirty="0"/>
               <a:pPr/>
-              <a:t>8/27/2016</a:t>
+              <a:t>9/15/2016</a:t>
             </a:fld>
             <a:endParaRPr lang="en-US" dirty="0"/>
           </a:p>
@@ -2102,7 +2196,7 @@
             <a:fld id="{B61BEF0D-F0BB-DE4B-95CE-6DB70DBA9567}" type="datetimeFigureOut">
               <a:rPr lang="en-US" dirty="0"/>
               <a:pPr/>
-              <a:t>8/27/2016</a:t>
+              <a:t>9/15/2016</a:t>
             </a:fld>
             <a:endParaRPr lang="en-US" dirty="0"/>
           </a:p>
@@ -2339,7 +2433,7 @@
             <a:fld id="{B61BEF0D-F0BB-DE4B-95CE-6DB70DBA9567}" type="datetimeFigureOut">
               <a:rPr lang="en-US" dirty="0"/>
               <a:pPr/>
-              <a:t>8/27/2016</a:t>
+              <a:t>9/15/2016</a:t>
             </a:fld>
             <a:endParaRPr lang="en-US" dirty="0"/>
           </a:p>
@@ -2643,7 +2737,7 @@
             <a:fld id="{B61BEF0D-F0BB-DE4B-95CE-6DB70DBA9567}" type="datetimeFigureOut">
               <a:rPr lang="en-US" dirty="0"/>
               <a:pPr/>
-              <a:t>8/27/2016</a:t>
+              <a:t>9/15/2016</a:t>
             </a:fld>
             <a:endParaRPr lang="en-US" dirty="0"/>
           </a:p>
@@ -2942,7 +3036,7 @@
             <a:fld id="{B61BEF0D-F0BB-DE4B-95CE-6DB70DBA9567}" type="datetimeFigureOut">
               <a:rPr lang="en-US" dirty="0"/>
               <a:pPr/>
-              <a:t>8/27/2016</a:t>
+              <a:t>9/15/2016</a:t>
             </a:fld>
             <a:endParaRPr lang="en-US" dirty="0"/>
           </a:p>
@@ -3361,7 +3455,7 @@
             <a:fld id="{B61BEF0D-F0BB-DE4B-95CE-6DB70DBA9567}" type="datetimeFigureOut">
               <a:rPr lang="en-US" dirty="0"/>
               <a:pPr/>
-              <a:t>8/27/2016</a:t>
+              <a:t>9/15/2016</a:t>
             </a:fld>
             <a:endParaRPr lang="en-US" dirty="0"/>
           </a:p>
@@ -3520,7 +3614,7 @@
             <a:fld id="{B61BEF0D-F0BB-DE4B-95CE-6DB70DBA9567}" type="datetimeFigureOut">
               <a:rPr lang="en-US" dirty="0"/>
               <a:pPr/>
-              <a:t>8/27/2016</a:t>
+              <a:t>9/15/2016</a:t>
             </a:fld>
             <a:endParaRPr lang="en-US" dirty="0"/>
           </a:p>
@@ -3612,7 +3706,7 @@
             <a:fld id="{B61BEF0D-F0BB-DE4B-95CE-6DB70DBA9567}" type="datetimeFigureOut">
               <a:rPr lang="en-US" dirty="0"/>
               <a:pPr/>
-              <a:t>8/27/2016</a:t>
+              <a:t>9/15/2016</a:t>
             </a:fld>
             <a:endParaRPr lang="en-US" dirty="0"/>
           </a:p>
@@ -3987,7 +4081,7 @@
             <a:fld id="{B61BEF0D-F0BB-DE4B-95CE-6DB70DBA9567}" type="datetimeFigureOut">
               <a:rPr lang="en-US" dirty="0"/>
               <a:pPr/>
-              <a:t>8/27/2016</a:t>
+              <a:t>9/15/2016</a:t>
             </a:fld>
             <a:endParaRPr lang="en-US" dirty="0"/>
           </a:p>
@@ -4273,7 +4367,7 @@
             <a:fld id="{B61BEF0D-F0BB-DE4B-95CE-6DB70DBA9567}" type="datetimeFigureOut">
               <a:rPr lang="en-US" dirty="0"/>
               <a:pPr/>
-              <a:t>8/27/2016</a:t>
+              <a:t>9/15/2016</a:t>
             </a:fld>
             <a:endParaRPr lang="en-US" dirty="0"/>
           </a:p>
@@ -4481,7 +4575,7 @@
             <a:fld id="{B61BEF0D-F0BB-DE4B-95CE-6DB70DBA9567}" type="datetimeFigureOut">
               <a:rPr lang="en-US" dirty="0"/>
               <a:pPr/>
-              <a:t>8/27/2016</a:t>
+              <a:t>9/15/2016</a:t>
             </a:fld>
             <a:endParaRPr lang="en-US" dirty="0"/>
           </a:p>
@@ -5119,7 +5213,7 @@
           <a:p>
             <a:r>
               <a:rPr lang="en-US" dirty="0"/>
-              <a:t>09-??-16</a:t>
+              <a:t>09-15-16</a:t>
             </a:r>
           </a:p>
           <a:p>
@@ -5182,6 +5276,745 @@
           <a:p>
             <a:r>
               <a:rPr lang="en-US" dirty="0"/>
+              <a:t>Sample </a:t>
+            </a:r>
+            <a:r>
+              <a:rPr lang="en-US" dirty="0" err="1"/>
+              <a:t>sql</a:t>
+            </a:r>
+            <a:r>
+              <a:rPr lang="en-US" dirty="0"/>
+              <a:t> statements</a:t>
+            </a:r>
+          </a:p>
+        </p:txBody>
+      </p:sp>
+      <p:pic>
+        <p:nvPicPr>
+          <p:cNvPr id="4" name="Content Placeholder 3"/>
+          <p:cNvPicPr>
+            <a:picLocks noGrp="1" noChangeAspect="1"/>
+          </p:cNvPicPr>
+          <p:nvPr>
+            <p:ph idx="1"/>
+          </p:nvPr>
+        </p:nvPicPr>
+        <p:blipFill>
+          <a:blip r:embed="rId2"/>
+          <a:stretch>
+            <a:fillRect/>
+          </a:stretch>
+        </p:blipFill>
+        <p:spPr>
+          <a:xfrm>
+            <a:off x="4966994" y="1983257"/>
+            <a:ext cx="6067417" cy="3288540"/>
+          </a:xfrm>
+          <a:prstGeom prst="rect">
+            <a:avLst/>
+          </a:prstGeom>
+        </p:spPr>
+      </p:pic>
+      <p:sp>
+        <p:nvSpPr>
+          <p:cNvPr id="5" name="TextBox 4"/>
+          <p:cNvSpPr txBox="1"/>
+          <p:nvPr/>
+        </p:nvSpPr>
+        <p:spPr>
+          <a:xfrm>
+            <a:off x="699796" y="2519265"/>
+            <a:ext cx="4058816" cy="4247317"/>
+          </a:xfrm>
+          <a:prstGeom prst="rect">
+            <a:avLst/>
+          </a:prstGeom>
+          <a:noFill/>
+        </p:spPr>
+        <p:txBody>
+          <a:bodyPr wrap="square" rtlCol="0">
+            <a:spAutoFit/>
+          </a:bodyPr>
+          <a:lstStyle/>
+          <a:p>
+            <a:r>
+              <a:rPr lang="en-US" dirty="0"/>
+              <a:t>&gt;SELECT FIRST_NAME FROM ADDRESS WHERE LAST_NAME=‘Mouse’;</a:t>
+            </a:r>
+          </a:p>
+          <a:p>
+            <a:endParaRPr lang="en-US" dirty="0"/>
+          </a:p>
+          <a:p>
+            <a:r>
+              <a:rPr lang="en-US" dirty="0">
+                <a:solidFill>
+                  <a:srgbClr val="00B050"/>
+                </a:solidFill>
+              </a:rPr>
+              <a:t>&lt;Mickey&gt; </a:t>
+            </a:r>
+          </a:p>
+          <a:p>
+            <a:pPr marL="285750" indent="-285750">
+              <a:buFont typeface="Wingdings" panose="05000000000000000000" pitchFamily="2" charset="2"/>
+              <a:buChar char="Ø"/>
+            </a:pPr>
+            <a:endParaRPr lang="en-US" dirty="0"/>
+          </a:p>
+          <a:p>
+            <a:r>
+              <a:rPr lang="en-US" dirty="0"/>
+              <a:t>&gt;SELECT * FROM ADDRESS WHERE AGE&gt;60;</a:t>
+            </a:r>
+          </a:p>
+          <a:p>
+            <a:endParaRPr lang="en-US" dirty="0"/>
+          </a:p>
+          <a:p>
+            <a:r>
+              <a:rPr lang="en-US" dirty="0">
+                <a:solidFill>
+                  <a:srgbClr val="00B050"/>
+                </a:solidFill>
+              </a:rPr>
+              <a:t>&lt;Mickey, Mouse, 123 Fantasy Way, Anaheim, 73&gt;</a:t>
+            </a:r>
+          </a:p>
+          <a:p>
+            <a:r>
+              <a:rPr lang="en-US" dirty="0">
+                <a:solidFill>
+                  <a:srgbClr val="00B050"/>
+                </a:solidFill>
+              </a:rPr>
+              <a:t>&lt;Donald, Duck, 555 Quack Street, Mallard, 65&gt;</a:t>
+            </a:r>
+          </a:p>
+          <a:p>
+            <a:r>
+              <a:rPr lang="en-US" dirty="0">
+                <a:solidFill>
+                  <a:srgbClr val="00B050"/>
+                </a:solidFill>
+              </a:rPr>
+              <a:t>&lt;Wiley, Coyote, 999 Acme Way, Canyon, 61&gt;</a:t>
+            </a:r>
+          </a:p>
+        </p:txBody>
+      </p:sp>
+      <p:sp>
+        <p:nvSpPr>
+          <p:cNvPr id="6" name="TextBox 5"/>
+          <p:cNvSpPr txBox="1"/>
+          <p:nvPr/>
+        </p:nvSpPr>
+        <p:spPr>
+          <a:xfrm>
+            <a:off x="5458408" y="6055567"/>
+            <a:ext cx="4363182" cy="369332"/>
+          </a:xfrm>
+          <a:prstGeom prst="rect">
+            <a:avLst/>
+          </a:prstGeom>
+          <a:noFill/>
+        </p:spPr>
+        <p:txBody>
+          <a:bodyPr wrap="none" rtlCol="0">
+            <a:spAutoFit/>
+          </a:bodyPr>
+          <a:lstStyle/>
+          <a:p>
+            <a:r>
+              <a:rPr lang="en-US" dirty="0"/>
+              <a:t>&gt;SELECT * FROM ADDRESS WHERE TRUE;</a:t>
+            </a:r>
+          </a:p>
+        </p:txBody>
+      </p:sp>
+    </p:spTree>
+    <p:extLst>
+      <p:ext uri="{BB962C8B-B14F-4D97-AF65-F5344CB8AC3E}">
+        <p14:creationId xmlns:p14="http://schemas.microsoft.com/office/powerpoint/2010/main" val="2510618656"/>
+      </p:ext>
+    </p:extLst>
+  </p:cSld>
+  <p:clrMapOvr>
+    <a:masterClrMapping/>
+  </p:clrMapOvr>
+  <p:timing>
+    <p:tnLst>
+      <p:par>
+        <p:cTn id="1" dur="indefinite" restart="never" nodeType="tmRoot">
+          <p:childTnLst>
+            <p:seq concurrent="1" nextAc="seek">
+              <p:cTn id="2" dur="indefinite" nodeType="mainSeq">
+                <p:childTnLst>
+                  <p:par>
+                    <p:cTn id="3" fill="hold">
+                      <p:stCondLst>
+                        <p:cond delay="indefinite"/>
+                      </p:stCondLst>
+                      <p:childTnLst>
+                        <p:par>
+                          <p:cTn id="4" fill="hold">
+                            <p:stCondLst>
+                              <p:cond delay="0"/>
+                            </p:stCondLst>
+                            <p:childTnLst>
+                              <p:par>
+                                <p:cTn id="5" presetID="1" presetClass="entr" presetSubtype="0" fill="hold" nodeType="clickEffect">
+                                  <p:stCondLst>
+                                    <p:cond delay="0"/>
+                                  </p:stCondLst>
+                                  <p:childTnLst>
+                                    <p:set>
+                                      <p:cBhvr>
+                                        <p:cTn id="6" dur="1" fill="hold">
+                                          <p:stCondLst>
+                                            <p:cond delay="0"/>
+                                          </p:stCondLst>
+                                        </p:cTn>
+                                        <p:tgtEl>
+                                          <p:spTgt spid="5">
+                                            <p:txEl>
+                                              <p:pRg st="0" end="0"/>
+                                            </p:txEl>
+                                          </p:spTgt>
+                                        </p:tgtEl>
+                                        <p:attrNameLst>
+                                          <p:attrName>style.visibility</p:attrName>
+                                        </p:attrNameLst>
+                                      </p:cBhvr>
+                                      <p:to>
+                                        <p:strVal val="visible"/>
+                                      </p:to>
+                                    </p:set>
+                                  </p:childTnLst>
+                                </p:cTn>
+                              </p:par>
+                            </p:childTnLst>
+                          </p:cTn>
+                        </p:par>
+                      </p:childTnLst>
+                    </p:cTn>
+                  </p:par>
+                  <p:par>
+                    <p:cTn id="7" fill="hold">
+                      <p:stCondLst>
+                        <p:cond delay="indefinite"/>
+                      </p:stCondLst>
+                      <p:childTnLst>
+                        <p:par>
+                          <p:cTn id="8" fill="hold">
+                            <p:stCondLst>
+                              <p:cond delay="0"/>
+                            </p:stCondLst>
+                            <p:childTnLst>
+                              <p:par>
+                                <p:cTn id="9" presetID="1" presetClass="entr" presetSubtype="0" fill="hold" nodeType="clickEffect">
+                                  <p:stCondLst>
+                                    <p:cond delay="0"/>
+                                  </p:stCondLst>
+                                  <p:childTnLst>
+                                    <p:set>
+                                      <p:cBhvr>
+                                        <p:cTn id="10" dur="1" fill="hold">
+                                          <p:stCondLst>
+                                            <p:cond delay="0"/>
+                                          </p:stCondLst>
+                                        </p:cTn>
+                                        <p:tgtEl>
+                                          <p:spTgt spid="5">
+                                            <p:txEl>
+                                              <p:pRg st="2" end="2"/>
+                                            </p:txEl>
+                                          </p:spTgt>
+                                        </p:tgtEl>
+                                        <p:attrNameLst>
+                                          <p:attrName>style.visibility</p:attrName>
+                                        </p:attrNameLst>
+                                      </p:cBhvr>
+                                      <p:to>
+                                        <p:strVal val="visible"/>
+                                      </p:to>
+                                    </p:set>
+                                  </p:childTnLst>
+                                </p:cTn>
+                              </p:par>
+                            </p:childTnLst>
+                          </p:cTn>
+                        </p:par>
+                      </p:childTnLst>
+                    </p:cTn>
+                  </p:par>
+                  <p:par>
+                    <p:cTn id="11" fill="hold">
+                      <p:stCondLst>
+                        <p:cond delay="indefinite"/>
+                      </p:stCondLst>
+                      <p:childTnLst>
+                        <p:par>
+                          <p:cTn id="12" fill="hold">
+                            <p:stCondLst>
+                              <p:cond delay="0"/>
+                            </p:stCondLst>
+                            <p:childTnLst>
+                              <p:par>
+                                <p:cTn id="13" presetID="1" presetClass="entr" presetSubtype="0" fill="hold" nodeType="clickEffect">
+                                  <p:stCondLst>
+                                    <p:cond delay="0"/>
+                                  </p:stCondLst>
+                                  <p:childTnLst>
+                                    <p:set>
+                                      <p:cBhvr>
+                                        <p:cTn id="14" dur="1" fill="hold">
+                                          <p:stCondLst>
+                                            <p:cond delay="0"/>
+                                          </p:stCondLst>
+                                        </p:cTn>
+                                        <p:tgtEl>
+                                          <p:spTgt spid="5">
+                                            <p:txEl>
+                                              <p:pRg st="4" end="4"/>
+                                            </p:txEl>
+                                          </p:spTgt>
+                                        </p:tgtEl>
+                                        <p:attrNameLst>
+                                          <p:attrName>style.visibility</p:attrName>
+                                        </p:attrNameLst>
+                                      </p:cBhvr>
+                                      <p:to>
+                                        <p:strVal val="visible"/>
+                                      </p:to>
+                                    </p:set>
+                                  </p:childTnLst>
+                                </p:cTn>
+                              </p:par>
+                            </p:childTnLst>
+                          </p:cTn>
+                        </p:par>
+                      </p:childTnLst>
+                    </p:cTn>
+                  </p:par>
+                  <p:par>
+                    <p:cTn id="15" fill="hold">
+                      <p:stCondLst>
+                        <p:cond delay="indefinite"/>
+                      </p:stCondLst>
+                      <p:childTnLst>
+                        <p:par>
+                          <p:cTn id="16" fill="hold">
+                            <p:stCondLst>
+                              <p:cond delay="0"/>
+                            </p:stCondLst>
+                            <p:childTnLst>
+                              <p:par>
+                                <p:cTn id="17" presetID="1" presetClass="entr" presetSubtype="0" fill="hold" nodeType="clickEffect">
+                                  <p:stCondLst>
+                                    <p:cond delay="0"/>
+                                  </p:stCondLst>
+                                  <p:childTnLst>
+                                    <p:set>
+                                      <p:cBhvr>
+                                        <p:cTn id="18" dur="1" fill="hold">
+                                          <p:stCondLst>
+                                            <p:cond delay="0"/>
+                                          </p:stCondLst>
+                                        </p:cTn>
+                                        <p:tgtEl>
+                                          <p:spTgt spid="5">
+                                            <p:txEl>
+                                              <p:pRg st="6" end="6"/>
+                                            </p:txEl>
+                                          </p:spTgt>
+                                        </p:tgtEl>
+                                        <p:attrNameLst>
+                                          <p:attrName>style.visibility</p:attrName>
+                                        </p:attrNameLst>
+                                      </p:cBhvr>
+                                      <p:to>
+                                        <p:strVal val="visible"/>
+                                      </p:to>
+                                    </p:set>
+                                  </p:childTnLst>
+                                </p:cTn>
+                              </p:par>
+                              <p:par>
+                                <p:cTn id="19" presetID="1" presetClass="entr" presetSubtype="0" fill="hold" nodeType="withEffect">
+                                  <p:stCondLst>
+                                    <p:cond delay="0"/>
+                                  </p:stCondLst>
+                                  <p:childTnLst>
+                                    <p:set>
+                                      <p:cBhvr>
+                                        <p:cTn id="20" dur="1" fill="hold">
+                                          <p:stCondLst>
+                                            <p:cond delay="0"/>
+                                          </p:stCondLst>
+                                        </p:cTn>
+                                        <p:tgtEl>
+                                          <p:spTgt spid="5">
+                                            <p:txEl>
+                                              <p:pRg st="7" end="7"/>
+                                            </p:txEl>
+                                          </p:spTgt>
+                                        </p:tgtEl>
+                                        <p:attrNameLst>
+                                          <p:attrName>style.visibility</p:attrName>
+                                        </p:attrNameLst>
+                                      </p:cBhvr>
+                                      <p:to>
+                                        <p:strVal val="visible"/>
+                                      </p:to>
+                                    </p:set>
+                                  </p:childTnLst>
+                                </p:cTn>
+                              </p:par>
+                              <p:par>
+                                <p:cTn id="21" presetID="1" presetClass="entr" presetSubtype="0" fill="hold" nodeType="withEffect">
+                                  <p:stCondLst>
+                                    <p:cond delay="0"/>
+                                  </p:stCondLst>
+                                  <p:childTnLst>
+                                    <p:set>
+                                      <p:cBhvr>
+                                        <p:cTn id="22" dur="1" fill="hold">
+                                          <p:stCondLst>
+                                            <p:cond delay="0"/>
+                                          </p:stCondLst>
+                                        </p:cTn>
+                                        <p:tgtEl>
+                                          <p:spTgt spid="5">
+                                            <p:txEl>
+                                              <p:pRg st="8" end="8"/>
+                                            </p:txEl>
+                                          </p:spTgt>
+                                        </p:tgtEl>
+                                        <p:attrNameLst>
+                                          <p:attrName>style.visibility</p:attrName>
+                                        </p:attrNameLst>
+                                      </p:cBhvr>
+                                      <p:to>
+                                        <p:strVal val="visible"/>
+                                      </p:to>
+                                    </p:set>
+                                  </p:childTnLst>
+                                </p:cTn>
+                              </p:par>
+                            </p:childTnLst>
+                          </p:cTn>
+                        </p:par>
+                      </p:childTnLst>
+                    </p:cTn>
+                  </p:par>
+                  <p:par>
+                    <p:cTn id="23" fill="hold">
+                      <p:stCondLst>
+                        <p:cond delay="indefinite"/>
+                      </p:stCondLst>
+                      <p:childTnLst>
+                        <p:par>
+                          <p:cTn id="24" fill="hold">
+                            <p:stCondLst>
+                              <p:cond delay="0"/>
+                            </p:stCondLst>
+                            <p:childTnLst>
+                              <p:par>
+                                <p:cTn id="25" presetID="1" presetClass="entr" presetSubtype="0" fill="hold" nodeType="clickEffect">
+                                  <p:stCondLst>
+                                    <p:cond delay="0"/>
+                                  </p:stCondLst>
+                                  <p:childTnLst>
+                                    <p:set>
+                                      <p:cBhvr>
+                                        <p:cTn id="26" dur="1" fill="hold">
+                                          <p:stCondLst>
+                                            <p:cond delay="0"/>
+                                          </p:stCondLst>
+                                        </p:cTn>
+                                        <p:tgtEl>
+                                          <p:spTgt spid="6">
+                                            <p:txEl>
+                                              <p:pRg st="0" end="0"/>
+                                            </p:txEl>
+                                          </p:spTgt>
+                                        </p:tgtEl>
+                                        <p:attrNameLst>
+                                          <p:attrName>style.visibility</p:attrName>
+                                        </p:attrNameLst>
+                                      </p:cBhvr>
+                                      <p:to>
+                                        <p:strVal val="visible"/>
+                                      </p:to>
+                                    </p:set>
+                                  </p:childTnLst>
+                                </p:cTn>
+                              </p:par>
+                            </p:childTnLst>
+                          </p:cTn>
+                        </p:par>
+                      </p:childTnLst>
+                    </p:cTn>
+                  </p:par>
+                </p:childTnLst>
+              </p:cTn>
+              <p:prevCondLst>
+                <p:cond evt="onPrev" delay="0">
+                  <p:tgtEl>
+                    <p:sldTgt/>
+                  </p:tgtEl>
+                </p:cond>
+              </p:prevCondLst>
+              <p:nextCondLst>
+                <p:cond evt="onNext" delay="0">
+                  <p:tgtEl>
+                    <p:sldTgt/>
+                  </p:tgtEl>
+                </p:cond>
+              </p:nextCondLst>
+            </p:seq>
+          </p:childTnLst>
+        </p:cTn>
+      </p:par>
+    </p:tnLst>
+  </p:timing>
+</p:sld>
+</file>
+
+<file path=ppt/slides/slide11.xml><?xml version="1.0" encoding="utf-8"?>
+<p:sld xmlns:a="http://schemas.openxmlformats.org/drawingml/2006/main" xmlns:r="http://schemas.openxmlformats.org/officeDocument/2006/relationships" xmlns:p="http://schemas.openxmlformats.org/presentationml/2006/main">
+  <p:cSld>
+    <p:spTree>
+      <p:nvGrpSpPr>
+        <p:cNvPr id="1" name=""/>
+        <p:cNvGrpSpPr/>
+        <p:nvPr/>
+      </p:nvGrpSpPr>
+      <p:grpSpPr>
+        <a:xfrm>
+          <a:off x="0" y="0"/>
+          <a:ext cx="0" cy="0"/>
+          <a:chOff x="0" y="0"/>
+          <a:chExt cx="0" cy="0"/>
+        </a:xfrm>
+      </p:grpSpPr>
+      <p:sp>
+        <p:nvSpPr>
+          <p:cNvPr id="2" name="Title 1"/>
+          <p:cNvSpPr>
+            <a:spLocks noGrp="1"/>
+          </p:cNvSpPr>
+          <p:nvPr>
+            <p:ph type="title"/>
+          </p:nvPr>
+        </p:nvSpPr>
+        <p:spPr/>
+        <p:txBody>
+          <a:bodyPr/>
+          <a:lstStyle/>
+          <a:p>
+            <a:r>
+              <a:rPr lang="en-US" dirty="0"/>
+              <a:t>How users interact with the database</a:t>
+            </a:r>
+          </a:p>
+        </p:txBody>
+      </p:sp>
+      <p:pic>
+        <p:nvPicPr>
+          <p:cNvPr id="4" name="Picture 3"/>
+          <p:cNvPicPr>
+            <a:picLocks noChangeAspect="1"/>
+          </p:cNvPicPr>
+          <p:nvPr/>
+        </p:nvPicPr>
+        <p:blipFill>
+          <a:blip r:embed="rId2"/>
+          <a:stretch>
+            <a:fillRect/>
+          </a:stretch>
+        </p:blipFill>
+        <p:spPr>
+          <a:xfrm>
+            <a:off x="808672" y="2300761"/>
+            <a:ext cx="5591175" cy="1085850"/>
+          </a:xfrm>
+          <a:prstGeom prst="rect">
+            <a:avLst/>
+          </a:prstGeom>
+        </p:spPr>
+      </p:pic>
+      <p:pic>
+        <p:nvPicPr>
+          <p:cNvPr id="5" name="Picture 4"/>
+          <p:cNvPicPr>
+            <a:picLocks noChangeAspect="1"/>
+          </p:cNvPicPr>
+          <p:nvPr/>
+        </p:nvPicPr>
+        <p:blipFill>
+          <a:blip r:embed="rId3"/>
+          <a:stretch>
+            <a:fillRect/>
+          </a:stretch>
+        </p:blipFill>
+        <p:spPr>
+          <a:xfrm>
+            <a:off x="6829991" y="2200749"/>
+            <a:ext cx="4780817" cy="1285875"/>
+          </a:xfrm>
+          <a:prstGeom prst="rect">
+            <a:avLst/>
+          </a:prstGeom>
+        </p:spPr>
+      </p:pic>
+      <p:pic>
+        <p:nvPicPr>
+          <p:cNvPr id="6" name="Picture 5"/>
+          <p:cNvPicPr>
+            <a:picLocks noChangeAspect="1"/>
+          </p:cNvPicPr>
+          <p:nvPr/>
+        </p:nvPicPr>
+        <p:blipFill>
+          <a:blip r:embed="rId4"/>
+          <a:stretch>
+            <a:fillRect/>
+          </a:stretch>
+        </p:blipFill>
+        <p:spPr>
+          <a:xfrm>
+            <a:off x="1271587" y="3707130"/>
+            <a:ext cx="9648825" cy="2781300"/>
+          </a:xfrm>
+          <a:prstGeom prst="rect">
+            <a:avLst/>
+          </a:prstGeom>
+        </p:spPr>
+      </p:pic>
+    </p:spTree>
+    <p:extLst>
+      <p:ext uri="{BB962C8B-B14F-4D97-AF65-F5344CB8AC3E}">
+        <p14:creationId xmlns:p14="http://schemas.microsoft.com/office/powerpoint/2010/main" val="2446312899"/>
+      </p:ext>
+    </p:extLst>
+  </p:cSld>
+  <p:clrMapOvr>
+    <a:masterClrMapping/>
+  </p:clrMapOvr>
+  <p:timing>
+    <p:tnLst>
+      <p:par>
+        <p:cTn id="1" dur="indefinite" restart="never" nodeType="tmRoot">
+          <p:childTnLst>
+            <p:seq concurrent="1" nextAc="seek">
+              <p:cTn id="2" dur="indefinite" nodeType="mainSeq">
+                <p:childTnLst>
+                  <p:par>
+                    <p:cTn id="3" fill="hold">
+                      <p:stCondLst>
+                        <p:cond delay="indefinite"/>
+                      </p:stCondLst>
+                      <p:childTnLst>
+                        <p:par>
+                          <p:cTn id="4" fill="hold">
+                            <p:stCondLst>
+                              <p:cond delay="0"/>
+                            </p:stCondLst>
+                            <p:childTnLst>
+                              <p:par>
+                                <p:cTn id="5" presetID="1" presetClass="entr" presetSubtype="0" fill="hold" nodeType="clickEffect">
+                                  <p:stCondLst>
+                                    <p:cond delay="0"/>
+                                  </p:stCondLst>
+                                  <p:childTnLst>
+                                    <p:set>
+                                      <p:cBhvr>
+                                        <p:cTn id="6" dur="1" fill="hold">
+                                          <p:stCondLst>
+                                            <p:cond delay="0"/>
+                                          </p:stCondLst>
+                                        </p:cTn>
+                                        <p:tgtEl>
+                                          <p:spTgt spid="6"/>
+                                        </p:tgtEl>
+                                        <p:attrNameLst>
+                                          <p:attrName>style.visibility</p:attrName>
+                                        </p:attrNameLst>
+                                      </p:cBhvr>
+                                      <p:to>
+                                        <p:strVal val="visible"/>
+                                      </p:to>
+                                    </p:set>
+                                  </p:childTnLst>
+                                </p:cTn>
+                              </p:par>
+                            </p:childTnLst>
+                          </p:cTn>
+                        </p:par>
+                      </p:childTnLst>
+                    </p:cTn>
+                  </p:par>
+                </p:childTnLst>
+              </p:cTn>
+              <p:prevCondLst>
+                <p:cond evt="onPrev" delay="0">
+                  <p:tgtEl>
+                    <p:sldTgt/>
+                  </p:tgtEl>
+                </p:cond>
+              </p:prevCondLst>
+              <p:nextCondLst>
+                <p:cond evt="onNext" delay="0">
+                  <p:tgtEl>
+                    <p:sldTgt/>
+                  </p:tgtEl>
+                </p:cond>
+              </p:nextCondLst>
+            </p:seq>
+          </p:childTnLst>
+        </p:cTn>
+      </p:par>
+    </p:tnLst>
+  </p:timing>
+</p:sld>
+</file>
+
+<file path=ppt/slides/slide12.xml><?xml version="1.0" encoding="utf-8"?>
+<p:sld xmlns:a="http://schemas.openxmlformats.org/drawingml/2006/main" xmlns:r="http://schemas.openxmlformats.org/officeDocument/2006/relationships" xmlns:p="http://schemas.openxmlformats.org/presentationml/2006/main">
+  <p:cSld>
+    <p:spTree>
+      <p:nvGrpSpPr>
+        <p:cNvPr id="1" name=""/>
+        <p:cNvGrpSpPr/>
+        <p:nvPr/>
+      </p:nvGrpSpPr>
+      <p:grpSpPr>
+        <a:xfrm>
+          <a:off x="0" y="0"/>
+          <a:ext cx="0" cy="0"/>
+          <a:chOff x="0" y="0"/>
+          <a:chExt cx="0" cy="0"/>
+        </a:xfrm>
+      </p:grpSpPr>
+      <p:sp>
+        <p:nvSpPr>
+          <p:cNvPr id="2" name="Title 1"/>
+          <p:cNvSpPr>
+            <a:spLocks noGrp="1"/>
+          </p:cNvSpPr>
+          <p:nvPr>
+            <p:ph type="title"/>
+          </p:nvPr>
+        </p:nvSpPr>
+        <p:spPr/>
+        <p:txBody>
+          <a:bodyPr/>
+          <a:lstStyle/>
+          <a:p>
+            <a:r>
+              <a:rPr lang="en-US" dirty="0"/>
               <a:t>SQL Injection</a:t>
             </a:r>
           </a:p>
@@ -5271,7 +6104,7 @@
 </p:sld>
 </file>
 
-<file path=ppt/slides/slide11.xml><?xml version="1.0" encoding="utf-8"?>
+<file path=ppt/slides/slide13.xml><?xml version="1.0" encoding="utf-8"?>
 <p:sld xmlns:a="http://schemas.openxmlformats.org/drawingml/2006/main" xmlns:r="http://schemas.openxmlformats.org/officeDocument/2006/relationships" xmlns:p="http://schemas.openxmlformats.org/presentationml/2006/main">
   <p:cSld>
     <p:spTree>
@@ -5413,7 +6246,7 @@
 </p:sld>
 </file>
 
-<file path=ppt/slides/slide12.xml><?xml version="1.0" encoding="utf-8"?>
+<file path=ppt/slides/slide14.xml><?xml version="1.0" encoding="utf-8"?>
 <p:sld xmlns:a="http://schemas.openxmlformats.org/drawingml/2006/main" xmlns:r="http://schemas.openxmlformats.org/officeDocument/2006/relationships" xmlns:p="http://schemas.openxmlformats.org/presentationml/2006/main">
   <p:cSld>
     <p:spTree>
@@ -6045,7 +6878,7 @@
 </p:sld>
 </file>
 
-<file path=ppt/slides/slide13.xml><?xml version="1.0" encoding="utf-8"?>
+<file path=ppt/slides/slide15.xml><?xml version="1.0" encoding="utf-8"?>
 <p:sld xmlns:a="http://schemas.openxmlformats.org/drawingml/2006/main" xmlns:r="http://schemas.openxmlformats.org/officeDocument/2006/relationships" xmlns:p="http://schemas.openxmlformats.org/presentationml/2006/main">
   <p:cSld>
     <p:spTree>
@@ -6121,7 +6954,7 @@
 </p:sld>
 </file>
 
-<file path=ppt/slides/slide14.xml><?xml version="1.0" encoding="utf-8"?>
+<file path=ppt/slides/slide16.xml><?xml version="1.0" encoding="utf-8"?>
 <p:sld xmlns:a="http://schemas.openxmlformats.org/drawingml/2006/main" xmlns:r="http://schemas.openxmlformats.org/officeDocument/2006/relationships" xmlns:p="http://schemas.openxmlformats.org/presentationml/2006/main">
   <p:cSld>
     <p:spTree>
@@ -6767,7 +7600,7 @@
 </p:sld>
 </file>
 
-<file path=ppt/slides/slide15.xml><?xml version="1.0" encoding="utf-8"?>
+<file path=ppt/slides/slide17.xml><?xml version="1.0" encoding="utf-8"?>
 <p:sld xmlns:a="http://schemas.openxmlformats.org/drawingml/2006/main" xmlns:r="http://schemas.openxmlformats.org/officeDocument/2006/relationships" xmlns:p="http://schemas.openxmlformats.org/presentationml/2006/main">
   <p:cSld>
     <p:spTree>
@@ -6971,7 +7804,7 @@
 </p:sld>
 </file>
 
-<file path=ppt/slides/slide16.xml><?xml version="1.0" encoding="utf-8"?>
+<file path=ppt/slides/slide18.xml><?xml version="1.0" encoding="utf-8"?>
 <p:sld xmlns:a="http://schemas.openxmlformats.org/drawingml/2006/main" xmlns:r="http://schemas.openxmlformats.org/officeDocument/2006/relationships" xmlns:p="http://schemas.openxmlformats.org/presentationml/2006/main">
   <p:cSld>
     <p:spTree>
@@ -7372,7 +8205,7 @@
 </p:sld>
 </file>
 
-<file path=ppt/slides/slide17.xml><?xml version="1.0" encoding="utf-8"?>
+<file path=ppt/slides/slide19.xml><?xml version="1.0" encoding="utf-8"?>
 <p:sld xmlns:a="http://schemas.openxmlformats.org/drawingml/2006/main" xmlns:r="http://schemas.openxmlformats.org/officeDocument/2006/relationships" xmlns:p="http://schemas.openxmlformats.org/presentationml/2006/main">
   <p:cSld>
     <p:spTree>
@@ -7448,311 +8281,6 @@
 </p:sld>
 </file>
 
-<file path=ppt/slides/slide18.xml><?xml version="1.0" encoding="utf-8"?>
-<p:sld xmlns:a="http://schemas.openxmlformats.org/drawingml/2006/main" xmlns:r="http://schemas.openxmlformats.org/officeDocument/2006/relationships" xmlns:p="http://schemas.openxmlformats.org/presentationml/2006/main">
-  <p:cSld>
-    <p:spTree>
-      <p:nvGrpSpPr>
-        <p:cNvPr id="1" name=""/>
-        <p:cNvGrpSpPr/>
-        <p:nvPr/>
-      </p:nvGrpSpPr>
-      <p:grpSpPr>
-        <a:xfrm>
-          <a:off x="0" y="0"/>
-          <a:ext cx="0" cy="0"/>
-          <a:chOff x="0" y="0"/>
-          <a:chExt cx="0" cy="0"/>
-        </a:xfrm>
-      </p:grpSpPr>
-      <p:sp>
-        <p:nvSpPr>
-          <p:cNvPr id="2" name="Title 1"/>
-          <p:cNvSpPr>
-            <a:spLocks noGrp="1"/>
-          </p:cNvSpPr>
-          <p:nvPr>
-            <p:ph type="title"/>
-          </p:nvPr>
-        </p:nvSpPr>
-        <p:spPr/>
-        <p:txBody>
-          <a:bodyPr/>
-          <a:lstStyle/>
-          <a:p>
-            <a:r>
-              <a:rPr lang="en-US" dirty="0"/>
-              <a:t>Blind </a:t>
-            </a:r>
-            <a:r>
-              <a:rPr lang="en-US" dirty="0" err="1"/>
-              <a:t>sql</a:t>
-            </a:r>
-            <a:r>
-              <a:rPr lang="en-US" dirty="0"/>
-              <a:t> injection demo</a:t>
-            </a:r>
-          </a:p>
-        </p:txBody>
-      </p:sp>
-      <p:sp>
-        <p:nvSpPr>
-          <p:cNvPr id="3" name="Content Placeholder 2"/>
-          <p:cNvSpPr>
-            <a:spLocks noGrp="1"/>
-          </p:cNvSpPr>
-          <p:nvPr>
-            <p:ph idx="1"/>
-          </p:nvPr>
-        </p:nvSpPr>
-        <p:spPr/>
-        <p:txBody>
-          <a:bodyPr>
-            <a:normAutofit/>
-          </a:bodyPr>
-          <a:lstStyle/>
-          <a:p>
-            <a:pPr marL="0" indent="0">
-              <a:buNone/>
-            </a:pPr>
-            <a:r>
-              <a:rPr lang="en-US" sz="4400" dirty="0"/>
-              <a:t>http://web2014.picoctf.com/injection4/</a:t>
-            </a:r>
-          </a:p>
-        </p:txBody>
-      </p:sp>
-    </p:spTree>
-    <p:extLst>
-      <p:ext uri="{BB962C8B-B14F-4D97-AF65-F5344CB8AC3E}">
-        <p14:creationId xmlns:p14="http://schemas.microsoft.com/office/powerpoint/2010/main" val="2489802902"/>
-      </p:ext>
-    </p:extLst>
-  </p:cSld>
-  <p:clrMapOvr>
-    <a:masterClrMapping/>
-  </p:clrMapOvr>
-</p:sld>
-</file>
-
-<file path=ppt/slides/slide19.xml><?xml version="1.0" encoding="utf-8"?>
-<p:sld xmlns:a="http://schemas.openxmlformats.org/drawingml/2006/main" xmlns:r="http://schemas.openxmlformats.org/officeDocument/2006/relationships" xmlns:p="http://schemas.openxmlformats.org/presentationml/2006/main">
-  <p:cSld>
-    <p:spTree>
-      <p:nvGrpSpPr>
-        <p:cNvPr id="1" name=""/>
-        <p:cNvGrpSpPr/>
-        <p:nvPr/>
-      </p:nvGrpSpPr>
-      <p:grpSpPr>
-        <a:xfrm>
-          <a:off x="0" y="0"/>
-          <a:ext cx="0" cy="0"/>
-          <a:chOff x="0" y="0"/>
-          <a:chExt cx="0" cy="0"/>
-        </a:xfrm>
-      </p:grpSpPr>
-      <p:sp>
-        <p:nvSpPr>
-          <p:cNvPr id="2" name="Title 1"/>
-          <p:cNvSpPr>
-            <a:spLocks noGrp="1"/>
-          </p:cNvSpPr>
-          <p:nvPr>
-            <p:ph type="title"/>
-          </p:nvPr>
-        </p:nvSpPr>
-        <p:spPr/>
-        <p:txBody>
-          <a:bodyPr/>
-          <a:lstStyle/>
-          <a:p>
-            <a:r>
-              <a:rPr lang="en-US" dirty="0"/>
-              <a:t>Other attacks</a:t>
-            </a:r>
-          </a:p>
-        </p:txBody>
-      </p:sp>
-      <p:sp>
-        <p:nvSpPr>
-          <p:cNvPr id="3" name="Content Placeholder 2"/>
-          <p:cNvSpPr>
-            <a:spLocks noGrp="1"/>
-          </p:cNvSpPr>
-          <p:nvPr>
-            <p:ph idx="1"/>
-          </p:nvPr>
-        </p:nvSpPr>
-        <p:spPr/>
-        <p:txBody>
-          <a:bodyPr/>
-          <a:lstStyle/>
-          <a:p>
-            <a:r>
-              <a:rPr lang="en-US" sz="2400" dirty="0"/>
-              <a:t>Time based SQL Injection attacks</a:t>
-            </a:r>
-          </a:p>
-          <a:p>
-            <a:pPr lvl="1"/>
-            <a:r>
-              <a:rPr lang="en-US" sz="2400" dirty="0"/>
-              <a:t>Instead of figuring HTML output, inject:</a:t>
-            </a:r>
-          </a:p>
-          <a:p>
-            <a:r>
-              <a:rPr lang="en-US" sz="2400" dirty="0"/>
-              <a:t>Encoding based</a:t>
-            </a:r>
-          </a:p>
-          <a:p>
-            <a:r>
-              <a:rPr lang="en-US" sz="2400" dirty="0"/>
-              <a:t>More</a:t>
-            </a:r>
-          </a:p>
-          <a:p>
-            <a:pPr lvl="1"/>
-            <a:endParaRPr lang="en-US" dirty="0"/>
-          </a:p>
-        </p:txBody>
-      </p:sp>
-      <p:sp>
-        <p:nvSpPr>
-          <p:cNvPr id="4" name="Rectangle 1"/>
-          <p:cNvSpPr>
-            <a:spLocks noChangeArrowheads="1"/>
-          </p:cNvSpPr>
-          <p:nvPr/>
-        </p:nvSpPr>
-        <p:spPr bwMode="auto">
-          <a:xfrm>
-            <a:off x="6198636" y="3427707"/>
-            <a:ext cx="4329405" cy="400110"/>
-          </a:xfrm>
-          <a:prstGeom prst="rect">
-            <a:avLst/>
-          </a:prstGeom>
-          <a:solidFill>
-            <a:srgbClr val="F9F9F9"/>
-          </a:solidFill>
-          <a:ln>
-            <a:noFill/>
-          </a:ln>
-          <a:effectLst/>
-          <a:extLst>
-            <a:ext uri="{91240B29-F687-4F45-9708-019B960494DF}">
-              <a14:hiddenLine xmlns:a14="http://schemas.microsoft.com/office/drawing/2010/main" w="9525">
-                <a:solidFill>
-                  <a:schemeClr val="tx1"/>
-                </a:solidFill>
-                <a:miter lim="800000"/>
-                <a:headEnd/>
-                <a:tailEnd/>
-              </a14:hiddenLine>
-            </a:ext>
-            <a:ext uri="{AF507438-7753-43E0-B8FC-AC1667EBCBE1}">
-              <a14:hiddenEffects xmlns:a14="http://schemas.microsoft.com/office/drawing/2010/main">
-                <a:effectLst>
-                  <a:outerShdw dist="35921" dir="2700000" algn="ctr" rotWithShape="0">
-                    <a:schemeClr val="bg2"/>
-                  </a:outerShdw>
-                </a:effectLst>
-              </a14:hiddenEffects>
-            </a:ext>
-          </a:extLst>
-        </p:spPr>
-        <p:txBody>
-          <a:bodyPr vert="horz" wrap="square" lIns="91440" tIns="45720" rIns="91440" bIns="45720" numCol="1" anchor="ctr" anchorCtr="0" compatLnSpc="1">
-            <a:prstTxWarp prst="textNoShape">
-              <a:avLst/>
-            </a:prstTxWarp>
-            <a:spAutoFit/>
-          </a:bodyPr>
-          <a:lstStyle/>
-          <a:p>
-            <a:pPr marL="0" marR="0" lvl="0" indent="0" algn="l" defTabSz="914400" rtl="0" eaLnBrk="0" fontAlgn="base" latinLnBrk="0" hangingPunct="0">
-              <a:lnSpc>
-                <a:spcPct val="100000"/>
-              </a:lnSpc>
-              <a:spcBef>
-                <a:spcPct val="0"/>
-              </a:spcBef>
-              <a:spcAft>
-                <a:spcPct val="0"/>
-              </a:spcAft>
-              <a:buClrTx/>
-              <a:buSzTx/>
-              <a:buFontTx/>
-              <a:buNone/>
-              <a:tabLst/>
-            </a:pPr>
-            <a:r>
-              <a:rPr kumimoji="0" lang="en-US" altLang="en-US" sz="2000" b="0" i="0" u="none" strike="noStrike" cap="none" normalizeH="0" baseline="0" dirty="0" err="1">
-                <a:ln>
-                  <a:noFill/>
-                </a:ln>
-                <a:solidFill>
-                  <a:srgbClr val="000000"/>
-                </a:solidFill>
-                <a:effectLst/>
-                <a:latin typeface="Courier New" panose="02070309020205020404" pitchFamily="49" charset="0"/>
-              </a:rPr>
-              <a:t>waitfor</a:t>
-            </a:r>
-            <a:r>
-              <a:rPr kumimoji="0" lang="en-US" altLang="en-US" sz="2000" b="0" i="0" u="none" strike="noStrike" cap="none" normalizeH="0" baseline="0" dirty="0">
-                <a:ln>
-                  <a:noFill/>
-                </a:ln>
-                <a:solidFill>
-                  <a:srgbClr val="000000"/>
-                </a:solidFill>
-                <a:effectLst/>
-                <a:latin typeface="Courier New" panose="02070309020205020404" pitchFamily="49" charset="0"/>
-              </a:rPr>
-              <a:t> delay '00:00:10'--</a:t>
-            </a:r>
-            <a:r>
-              <a:rPr kumimoji="0" lang="en-US" altLang="en-US" sz="2000" b="0" i="0" u="none" strike="noStrike" cap="none" normalizeH="0" baseline="0" dirty="0">
-                <a:ln>
-                  <a:noFill/>
-                </a:ln>
-                <a:solidFill>
-                  <a:schemeClr val="tx1"/>
-                </a:solidFill>
-                <a:effectLst/>
-              </a:rPr>
-              <a:t> </a:t>
-            </a:r>
-            <a:endParaRPr kumimoji="0" lang="en-US" altLang="en-US" sz="2000" b="0" i="0" u="none" strike="noStrike" cap="none" normalizeH="0" baseline="0" dirty="0">
-              <a:ln>
-                <a:noFill/>
-              </a:ln>
-              <a:solidFill>
-                <a:schemeClr val="tx1"/>
-              </a:solidFill>
-              <a:effectLst/>
-              <a:latin typeface="Arial" panose="020B0604020202020204" pitchFamily="34" charset="0"/>
-            </a:endParaRPr>
-          </a:p>
-        </p:txBody>
-      </p:sp>
-    </p:spTree>
-    <p:extLst>
-      <p:ext uri="{BB962C8B-B14F-4D97-AF65-F5344CB8AC3E}">
-        <p14:creationId xmlns:p14="http://schemas.microsoft.com/office/powerpoint/2010/main" val="3239466746"/>
-      </p:ext>
-    </p:extLst>
-  </p:cSld>
-  <p:clrMapOvr>
-    <a:masterClrMapping/>
-  </p:clrMapOvr>
-</p:sld>
-</file>
-
 <file path=ppt/slides/slide2.xml><?xml version="1.0" encoding="utf-8"?>
 <p:sld xmlns:a="http://schemas.openxmlformats.org/drawingml/2006/main" xmlns:r="http://schemas.openxmlformats.org/officeDocument/2006/relationships" xmlns:p="http://schemas.openxmlformats.org/presentationml/2006/main">
   <p:cSld>
@@ -7787,105 +8315,148 @@
           <a:p>
             <a:r>
               <a:rPr lang="en-US" dirty="0"/>
-              <a:t>3 Types of </a:t>
+              <a:t>Club news</a:t>
+            </a:r>
+          </a:p>
+        </p:txBody>
+      </p:sp>
+      <p:sp>
+        <p:nvSpPr>
+          <p:cNvPr id="3" name="Content Placeholder 2"/>
+          <p:cNvSpPr>
+            <a:spLocks noGrp="1"/>
+          </p:cNvSpPr>
+          <p:nvPr>
+            <p:ph idx="1"/>
+          </p:nvPr>
+        </p:nvSpPr>
+        <p:spPr/>
+        <p:txBody>
+          <a:bodyPr/>
+          <a:lstStyle/>
+          <a:p>
+            <a:r>
+              <a:rPr lang="en-US" dirty="0"/>
+              <a:t>CSAW CTF: THIS WEEKEND!!</a:t>
+            </a:r>
+          </a:p>
+          <a:p>
+            <a:pPr lvl="1"/>
+            <a:r>
+              <a:rPr lang="en-US" dirty="0"/>
+              <a:t>6PM Friday – if you want to be awesome, you’ll stop by</a:t>
+            </a:r>
+          </a:p>
+          <a:p>
+            <a:pPr lvl="1"/>
+            <a:r>
+              <a:rPr lang="en-US" dirty="0"/>
+              <a:t>10AM Saturday</a:t>
+            </a:r>
+          </a:p>
+          <a:p>
+            <a:pPr lvl="1"/>
+            <a:r>
+              <a:rPr lang="en-US" dirty="0"/>
+              <a:t>Tacos, Food, Fun, Hacking, Coolness, etc.</a:t>
+            </a:r>
+          </a:p>
+          <a:p>
+            <a:pPr lvl="1"/>
+            <a:r>
+              <a:rPr lang="en-US" dirty="0"/>
+              <a:t>If you join our team, YOU could get excused from your classwork to compete in the finals!!</a:t>
+            </a:r>
+          </a:p>
+          <a:p>
+            <a:r>
+              <a:rPr lang="en-US" dirty="0"/>
+              <a:t>Next week Cisco</a:t>
+            </a:r>
+          </a:p>
+          <a:p>
+            <a:r>
+              <a:rPr lang="en-US" dirty="0"/>
+              <a:t>Car hacking</a:t>
+            </a:r>
+          </a:p>
+          <a:p>
+            <a:r>
+              <a:rPr lang="en-US" dirty="0"/>
+              <a:t>Email list issues, our bad</a:t>
+            </a:r>
+          </a:p>
+          <a:p>
+            <a:r>
+              <a:rPr lang="en-US" dirty="0"/>
+              <a:t>Join #</a:t>
             </a:r>
             <a:r>
               <a:rPr lang="en-US" dirty="0" err="1"/>
-              <a:t>sql</a:t>
-            </a:r>
-            <a:r>
-              <a:rPr lang="en-US" dirty="0"/>
-              <a:t> injection</a:t>
-            </a:r>
-          </a:p>
-        </p:txBody>
-      </p:sp>
-      <p:sp>
-        <p:nvSpPr>
-          <p:cNvPr id="3" name="Content Placeholder 2"/>
-          <p:cNvSpPr>
-            <a:spLocks noGrp="1"/>
-          </p:cNvSpPr>
-          <p:nvPr>
-            <p:ph idx="1"/>
-          </p:nvPr>
-        </p:nvSpPr>
-        <p:spPr>
-          <a:xfrm>
-            <a:off x="2736563" y="2087190"/>
-            <a:ext cx="11029615" cy="3678303"/>
-          </a:xfrm>
-        </p:spPr>
-        <p:txBody>
-          <a:bodyPr>
-            <a:normAutofit/>
-          </a:bodyPr>
-          <a:lstStyle/>
-          <a:p>
-            <a:r>
-              <a:rPr lang="en-US" sz="3600" dirty="0"/>
-              <a:t>Simple</a:t>
-            </a:r>
-          </a:p>
-          <a:p>
-            <a:r>
-              <a:rPr lang="en-US" sz="3600" dirty="0"/>
-              <a:t>Error based</a:t>
-            </a:r>
-          </a:p>
-          <a:p>
-            <a:r>
-              <a:rPr lang="en-US" sz="3600" dirty="0"/>
-              <a:t>Blind</a:t>
-            </a:r>
+              <a:t>thedeepestweb</a:t>
+            </a:r>
+            <a:r>
+              <a:rPr lang="en-US" dirty="0"/>
+              <a:t> on </a:t>
+            </a:r>
+            <a:r>
+              <a:rPr lang="en-US" dirty="0" err="1"/>
+              <a:t>freenode</a:t>
+            </a:r>
+            <a:r>
+              <a:rPr lang="en-US" dirty="0"/>
+              <a:t> IRC </a:t>
+            </a:r>
+            <a:r>
+              <a:rPr lang="en-US" dirty="0">
+                <a:sym typeface="Wingdings" panose="05000000000000000000" pitchFamily="2" charset="2"/>
+              </a:rPr>
+              <a:t>to chill with past </a:t>
+            </a:r>
+            <a:r>
+              <a:rPr lang="en-US" dirty="0" err="1">
+                <a:sym typeface="Wingdings" panose="05000000000000000000" pitchFamily="2" charset="2"/>
+              </a:rPr>
+              <a:t>GreyHat</a:t>
+            </a:r>
+            <a:r>
+              <a:rPr lang="en-US" dirty="0">
+                <a:sym typeface="Wingdings" panose="05000000000000000000" pitchFamily="2" charset="2"/>
+              </a:rPr>
+              <a:t> alumni and talk to really cool people</a:t>
+            </a:r>
+            <a:endParaRPr lang="en-US" dirty="0"/>
           </a:p>
         </p:txBody>
       </p:sp>
       <p:pic>
         <p:nvPicPr>
-          <p:cNvPr id="1026" name="Picture 2" descr="http://www.mobafire.com/images/champion/icon/lee-sin.png"/>
+          <p:cNvPr id="4" name="Picture 3"/>
           <p:cNvPicPr>
-            <a:picLocks noChangeAspect="1" noChangeArrowheads="1"/>
+            <a:picLocks noChangeAspect="1"/>
           </p:cNvPicPr>
           <p:nvPr/>
         </p:nvPicPr>
         <p:blipFill>
-          <a:blip r:embed="rId3">
-            <a:extLst>
-              <a:ext uri="{28A0092B-C50C-407E-A947-70E740481C1C}">
-                <a14:useLocalDpi xmlns:a14="http://schemas.microsoft.com/office/drawing/2010/main" val="0"/>
-              </a:ext>
-            </a:extLst>
-          </a:blip>
-          <a:srcRect/>
+          <a:blip r:embed="rId2"/>
           <a:stretch>
             <a:fillRect/>
           </a:stretch>
         </p:blipFill>
-        <p:spPr bwMode="auto">
+        <p:spPr>
           <a:xfrm>
-            <a:off x="4363680" y="4410220"/>
-            <a:ext cx="1143000" cy="1143001"/>
+            <a:off x="8084126" y="1986553"/>
+            <a:ext cx="3187411" cy="1738588"/>
           </a:xfrm>
           <a:prstGeom prst="rect">
             <a:avLst/>
           </a:prstGeom>
-          <a:noFill/>
-          <a:extLst>
-            <a:ext uri="{909E8E84-426E-40DD-AFC4-6F175D3DCCD1}">
-              <a14:hiddenFill xmlns:a14="http://schemas.microsoft.com/office/drawing/2010/main">
-                <a:solidFill>
-                  <a:srgbClr val="FFFFFF"/>
-                </a:solidFill>
-              </a14:hiddenFill>
-            </a:ext>
-          </a:extLst>
         </p:spPr>
       </p:pic>
     </p:spTree>
     <p:extLst>
       <p:ext uri="{BB962C8B-B14F-4D97-AF65-F5344CB8AC3E}">
-        <p14:creationId xmlns:p14="http://schemas.microsoft.com/office/powerpoint/2010/main" val="2243770139"/>
+        <p14:creationId xmlns:p14="http://schemas.microsoft.com/office/powerpoint/2010/main" val="2623843723"/>
       </p:ext>
     </p:extLst>
   </p:cSld>
@@ -7913,7 +8484,7 @@
                             </p:stCondLst>
                             <p:childTnLst>
                               <p:par>
-                                <p:cTn id="5" presetID="1" presetClass="entr" presetSubtype="0" fill="hold" grpId="0" nodeType="clickEffect">
+                                <p:cTn id="5" presetID="1" presetClass="entr" presetSubtype="0" fill="hold" nodeType="clickEffect">
                                   <p:stCondLst>
                                     <p:cond delay="0"/>
                                   </p:stCondLst>
@@ -7943,33 +8514,15 @@
                                   </p:childTnLst>
                                 </p:cTn>
                               </p:par>
-                            </p:childTnLst>
-                          </p:cTn>
-                        </p:par>
-                      </p:childTnLst>
-                    </p:cTn>
-                  </p:par>
-                  <p:par>
-                    <p:cTn id="7" fill="hold">
-                      <p:stCondLst>
-                        <p:cond delay="indefinite"/>
-                      </p:stCondLst>
-                      <p:childTnLst>
-                        <p:par>
-                          <p:cTn id="8" fill="hold">
-                            <p:stCondLst>
-                              <p:cond delay="0"/>
-                            </p:stCondLst>
-                            <p:childTnLst>
                               <p:par>
-                                <p:cTn id="9" presetID="1" presetClass="entr" presetSubtype="0" fill="hold" grpId="0" nodeType="clickEffect">
+                                <p:cTn id="7" presetID="1" presetClass="entr" presetSubtype="0" fill="hold" nodeType="withEffect">
                                   <p:stCondLst>
                                     <p:cond delay="0"/>
                                   </p:stCondLst>
                                   <p:childTnLst>
                                     <p:set>
                                       <p:cBhvr>
-                                        <p:cTn id="10" dur="1" fill="hold">
+                                        <p:cTn id="8" dur="1" fill="hold">
                                           <p:stCondLst>
                                             <p:cond delay="0"/>
                                           </p:stCondLst>
@@ -7992,26 +8545,70 @@
                                   </p:childTnLst>
                                 </p:cTn>
                               </p:par>
-                            </p:childTnLst>
-                          </p:cTn>
-                        </p:par>
-                      </p:childTnLst>
-                    </p:cTn>
-                  </p:par>
-                  <p:par>
-                    <p:cTn id="11" fill="hold">
-                      <p:stCondLst>
-                        <p:cond delay="indefinite"/>
-                      </p:stCondLst>
-                      <p:childTnLst>
-                        <p:par>
-                          <p:cTn id="12" fill="hold">
-                            <p:stCondLst>
-                              <p:cond delay="0"/>
-                            </p:stCondLst>
-                            <p:childTnLst>
                               <p:par>
-                                <p:cTn id="13" presetID="1" presetClass="entr" presetSubtype="0" fill="hold" grpId="0" nodeType="clickEffect">
+                                <p:cTn id="9" presetID="1" presetClass="entr" presetSubtype="0" fill="hold" nodeType="withEffect">
+                                  <p:stCondLst>
+                                    <p:cond delay="0"/>
+                                  </p:stCondLst>
+                                  <p:childTnLst>
+                                    <p:set>
+                                      <p:cBhvr>
+                                        <p:cTn id="10" dur="1" fill="hold">
+                                          <p:stCondLst>
+                                            <p:cond delay="0"/>
+                                          </p:stCondLst>
+                                        </p:cTn>
+                                        <p:tgtEl>
+                                          <p:spTgt spid="3">
+                                            <p:txEl>
+                                              <p:pRg st="2" end="2"/>
+                                            </p:txEl>
+                                          </p:spTgt>
+                                        </p:tgtEl>
+                                        <p:attrNameLst>
+                                          <p:attrName>style.visibility</p:attrName>
+                                        </p:attrNameLst>
+                                      </p:cBhvr>
+                                      <p:to>
+                                        <p:strVal val="visible"/>
+                                      </p:to>
+                                    </p:set>
+                                  </p:childTnLst>
+                                </p:cTn>
+                              </p:par>
+                              <p:par>
+                                <p:cTn id="11" presetID="1" presetClass="entr" presetSubtype="0" fill="hold" nodeType="withEffect">
+                                  <p:stCondLst>
+                                    <p:cond delay="0"/>
+                                  </p:stCondLst>
+                                  <p:childTnLst>
+                                    <p:set>
+                                      <p:cBhvr>
+                                        <p:cTn id="12" dur="1" fill="hold">
+                                          <p:stCondLst>
+                                            <p:cond delay="0"/>
+                                          </p:stCondLst>
+                                        </p:cTn>
+                                        <p:tgtEl>
+                                          <p:spTgt spid="3">
+                                            <p:txEl>
+                                              <p:pRg st="3" end="3"/>
+                                            </p:txEl>
+                                          </p:spTgt>
+                                        </p:tgtEl>
+                                        <p:attrNameLst>
+                                          <p:attrName>style.visibility</p:attrName>
+                                        </p:attrNameLst>
+                                      </p:cBhvr>
+                                      <p:to>
+                                        <p:strVal val="visible"/>
+                                      </p:to>
+                                    </p:set>
+                                  </p:childTnLst>
+                                </p:cTn>
+                              </p:par>
+                              <p:par>
+                                <p:cTn id="13" presetID="1" presetClass="entr" presetSubtype="0" fill="hold" nodeType="withEffect">
                                   <p:stCondLst>
                                     <p:cond delay="0"/>
                                   </p:stCondLst>
@@ -8026,7 +8623,7 @@
                                         <p:tgtEl>
                                           <p:spTgt spid="3">
                                             <p:txEl>
-                                              <p:pRg st="2" end="2"/>
+                                              <p:pRg st="4" end="4"/>
                                             </p:txEl>
                                           </p:spTgt>
                                         </p:tgtEl>
@@ -8055,7 +8652,203 @@
                                           </p:stCondLst>
                                         </p:cTn>
                                         <p:tgtEl>
-                                          <p:spTgt spid="1026"/>
+                                          <p:spTgt spid="4"/>
+                                        </p:tgtEl>
+                                        <p:attrNameLst>
+                                          <p:attrName>style.visibility</p:attrName>
+                                        </p:attrNameLst>
+                                      </p:cBhvr>
+                                      <p:to>
+                                        <p:strVal val="visible"/>
+                                      </p:to>
+                                    </p:set>
+                                  </p:childTnLst>
+                                </p:cTn>
+                              </p:par>
+                            </p:childTnLst>
+                          </p:cTn>
+                        </p:par>
+                      </p:childTnLst>
+                    </p:cTn>
+                  </p:par>
+                  <p:par>
+                    <p:cTn id="17" fill="hold">
+                      <p:stCondLst>
+                        <p:cond delay="indefinite"/>
+                      </p:stCondLst>
+                      <p:childTnLst>
+                        <p:par>
+                          <p:cTn id="18" fill="hold">
+                            <p:stCondLst>
+                              <p:cond delay="0"/>
+                            </p:stCondLst>
+                            <p:childTnLst>
+                              <p:par>
+                                <p:cTn id="19" presetID="1" presetClass="entr" presetSubtype="0" fill="hold" nodeType="clickEffect">
+                                  <p:stCondLst>
+                                    <p:cond delay="0"/>
+                                  </p:stCondLst>
+                                  <p:childTnLst>
+                                    <p:set>
+                                      <p:cBhvr>
+                                        <p:cTn id="20" dur="1" fill="hold">
+                                          <p:stCondLst>
+                                            <p:cond delay="0"/>
+                                          </p:stCondLst>
+                                        </p:cTn>
+                                        <p:tgtEl>
+                                          <p:spTgt spid="3">
+                                            <p:txEl>
+                                              <p:pRg st="5" end="5"/>
+                                            </p:txEl>
+                                          </p:spTgt>
+                                        </p:tgtEl>
+                                        <p:attrNameLst>
+                                          <p:attrName>style.visibility</p:attrName>
+                                        </p:attrNameLst>
+                                      </p:cBhvr>
+                                      <p:to>
+                                        <p:strVal val="visible"/>
+                                      </p:to>
+                                    </p:set>
+                                  </p:childTnLst>
+                                </p:cTn>
+                              </p:par>
+                            </p:childTnLst>
+                          </p:cTn>
+                        </p:par>
+                      </p:childTnLst>
+                    </p:cTn>
+                  </p:par>
+                  <p:par>
+                    <p:cTn id="21" fill="hold">
+                      <p:stCondLst>
+                        <p:cond delay="indefinite"/>
+                      </p:stCondLst>
+                      <p:childTnLst>
+                        <p:par>
+                          <p:cTn id="22" fill="hold">
+                            <p:stCondLst>
+                              <p:cond delay="0"/>
+                            </p:stCondLst>
+                            <p:childTnLst>
+                              <p:par>
+                                <p:cTn id="23" presetID="1" presetClass="entr" presetSubtype="0" fill="hold" nodeType="clickEffect">
+                                  <p:stCondLst>
+                                    <p:cond delay="0"/>
+                                  </p:stCondLst>
+                                  <p:childTnLst>
+                                    <p:set>
+                                      <p:cBhvr>
+                                        <p:cTn id="24" dur="1" fill="hold">
+                                          <p:stCondLst>
+                                            <p:cond delay="0"/>
+                                          </p:stCondLst>
+                                        </p:cTn>
+                                        <p:tgtEl>
+                                          <p:spTgt spid="3">
+                                            <p:txEl>
+                                              <p:pRg st="6" end="6"/>
+                                            </p:txEl>
+                                          </p:spTgt>
+                                        </p:tgtEl>
+                                        <p:attrNameLst>
+                                          <p:attrName>style.visibility</p:attrName>
+                                        </p:attrNameLst>
+                                      </p:cBhvr>
+                                      <p:to>
+                                        <p:strVal val="visible"/>
+                                      </p:to>
+                                    </p:set>
+                                  </p:childTnLst>
+                                </p:cTn>
+                              </p:par>
+                            </p:childTnLst>
+                          </p:cTn>
+                        </p:par>
+                      </p:childTnLst>
+                    </p:cTn>
+                  </p:par>
+                  <p:par>
+                    <p:cTn id="25" fill="hold">
+                      <p:stCondLst>
+                        <p:cond delay="indefinite"/>
+                      </p:stCondLst>
+                      <p:childTnLst>
+                        <p:par>
+                          <p:cTn id="26" fill="hold">
+                            <p:stCondLst>
+                              <p:cond delay="0"/>
+                            </p:stCondLst>
+                            <p:childTnLst>
+                              <p:par>
+                                <p:cTn id="27" presetID="1" presetClass="entr" presetSubtype="0" fill="hold" nodeType="clickEffect">
+                                  <p:stCondLst>
+                                    <p:cond delay="0"/>
+                                  </p:stCondLst>
+                                  <p:childTnLst>
+                                    <p:set>
+                                      <p:cBhvr>
+                                        <p:cTn id="28" dur="1" fill="hold">
+                                          <p:stCondLst>
+                                            <p:cond delay="0"/>
+                                          </p:stCondLst>
+                                        </p:cTn>
+                                        <p:tgtEl>
+                                          <p:spTgt spid="3">
+                                            <p:txEl>
+                                              <p:pRg st="7" end="7"/>
+                                            </p:txEl>
+                                          </p:spTgt>
+                                        </p:tgtEl>
+                                        <p:attrNameLst>
+                                          <p:attrName>style.visibility</p:attrName>
+                                        </p:attrNameLst>
+                                      </p:cBhvr>
+                                      <p:to>
+                                        <p:strVal val="visible"/>
+                                      </p:to>
+                                    </p:set>
+                                  </p:childTnLst>
+                                </p:cTn>
+                              </p:par>
+                            </p:childTnLst>
+                          </p:cTn>
+                        </p:par>
+                      </p:childTnLst>
+                    </p:cTn>
+                  </p:par>
+                  <p:par>
+                    <p:cTn id="29" fill="hold">
+                      <p:stCondLst>
+                        <p:cond delay="indefinite"/>
+                      </p:stCondLst>
+                      <p:childTnLst>
+                        <p:par>
+                          <p:cTn id="30" fill="hold">
+                            <p:stCondLst>
+                              <p:cond delay="0"/>
+                            </p:stCondLst>
+                            <p:childTnLst>
+                              <p:par>
+                                <p:cTn id="31" presetID="1" presetClass="entr" presetSubtype="0" fill="hold" nodeType="clickEffect">
+                                  <p:stCondLst>
+                                    <p:cond delay="0"/>
+                                  </p:stCondLst>
+                                  <p:childTnLst>
+                                    <p:set>
+                                      <p:cBhvr>
+                                        <p:cTn id="32" dur="1" fill="hold">
+                                          <p:stCondLst>
+                                            <p:cond delay="0"/>
+                                          </p:stCondLst>
+                                        </p:cTn>
+                                        <p:tgtEl>
+                                          <p:spTgt spid="3">
+                                            <p:txEl>
+                                              <p:pRg st="8" end="8"/>
+                                            </p:txEl>
+                                          </p:spTgt>
                                         </p:tgtEl>
                                         <p:attrNameLst>
                                           <p:attrName>style.visibility</p:attrName>
@@ -8095,14 +8888,316 @@
         </p:cTn>
       </p:par>
     </p:tnLst>
-    <p:bldLst>
-      <p:bldP spid="3" grpId="0" build="p"/>
-    </p:bldLst>
   </p:timing>
 </p:sld>
 </file>
 
 <file path=ppt/slides/slide20.xml><?xml version="1.0" encoding="utf-8"?>
+<p:sld xmlns:a="http://schemas.openxmlformats.org/drawingml/2006/main" xmlns:r="http://schemas.openxmlformats.org/officeDocument/2006/relationships" xmlns:p="http://schemas.openxmlformats.org/presentationml/2006/main">
+  <p:cSld>
+    <p:spTree>
+      <p:nvGrpSpPr>
+        <p:cNvPr id="1" name=""/>
+        <p:cNvGrpSpPr/>
+        <p:nvPr/>
+      </p:nvGrpSpPr>
+      <p:grpSpPr>
+        <a:xfrm>
+          <a:off x="0" y="0"/>
+          <a:ext cx="0" cy="0"/>
+          <a:chOff x="0" y="0"/>
+          <a:chExt cx="0" cy="0"/>
+        </a:xfrm>
+      </p:grpSpPr>
+      <p:sp>
+        <p:nvSpPr>
+          <p:cNvPr id="2" name="Title 1"/>
+          <p:cNvSpPr>
+            <a:spLocks noGrp="1"/>
+          </p:cNvSpPr>
+          <p:nvPr>
+            <p:ph type="title"/>
+          </p:nvPr>
+        </p:nvSpPr>
+        <p:spPr/>
+        <p:txBody>
+          <a:bodyPr/>
+          <a:lstStyle/>
+          <a:p>
+            <a:r>
+              <a:rPr lang="en-US" dirty="0"/>
+              <a:t>Blind </a:t>
+            </a:r>
+            <a:r>
+              <a:rPr lang="en-US" dirty="0" err="1"/>
+              <a:t>sql</a:t>
+            </a:r>
+            <a:r>
+              <a:rPr lang="en-US" dirty="0"/>
+              <a:t> injection demo</a:t>
+            </a:r>
+          </a:p>
+        </p:txBody>
+      </p:sp>
+      <p:sp>
+        <p:nvSpPr>
+          <p:cNvPr id="3" name="Content Placeholder 2"/>
+          <p:cNvSpPr>
+            <a:spLocks noGrp="1"/>
+          </p:cNvSpPr>
+          <p:nvPr>
+            <p:ph idx="1"/>
+          </p:nvPr>
+        </p:nvSpPr>
+        <p:spPr/>
+        <p:txBody>
+          <a:bodyPr>
+            <a:normAutofit/>
+          </a:bodyPr>
+          <a:lstStyle/>
+          <a:p>
+            <a:pPr marL="0" indent="0">
+              <a:buNone/>
+            </a:pPr>
+            <a:r>
+              <a:rPr lang="en-US" sz="4400" dirty="0"/>
+              <a:t>http://web2014.picoctf.com/injection4/</a:t>
+            </a:r>
+          </a:p>
+        </p:txBody>
+      </p:sp>
+    </p:spTree>
+    <p:extLst>
+      <p:ext uri="{BB962C8B-B14F-4D97-AF65-F5344CB8AC3E}">
+        <p14:creationId xmlns:p14="http://schemas.microsoft.com/office/powerpoint/2010/main" val="2489802902"/>
+      </p:ext>
+    </p:extLst>
+  </p:cSld>
+  <p:clrMapOvr>
+    <a:masterClrMapping/>
+  </p:clrMapOvr>
+</p:sld>
+</file>
+
+<file path=ppt/slides/slide21.xml><?xml version="1.0" encoding="utf-8"?>
+<p:sld xmlns:a="http://schemas.openxmlformats.org/drawingml/2006/main" xmlns:r="http://schemas.openxmlformats.org/officeDocument/2006/relationships" xmlns:p="http://schemas.openxmlformats.org/presentationml/2006/main">
+  <p:cSld>
+    <p:spTree>
+      <p:nvGrpSpPr>
+        <p:cNvPr id="1" name=""/>
+        <p:cNvGrpSpPr/>
+        <p:nvPr/>
+      </p:nvGrpSpPr>
+      <p:grpSpPr>
+        <a:xfrm>
+          <a:off x="0" y="0"/>
+          <a:ext cx="0" cy="0"/>
+          <a:chOff x="0" y="0"/>
+          <a:chExt cx="0" cy="0"/>
+        </a:xfrm>
+      </p:grpSpPr>
+      <p:sp>
+        <p:nvSpPr>
+          <p:cNvPr id="2" name="Title 1"/>
+          <p:cNvSpPr>
+            <a:spLocks noGrp="1"/>
+          </p:cNvSpPr>
+          <p:nvPr>
+            <p:ph type="title"/>
+          </p:nvPr>
+        </p:nvSpPr>
+        <p:spPr/>
+        <p:txBody>
+          <a:bodyPr/>
+          <a:lstStyle/>
+          <a:p>
+            <a:r>
+              <a:rPr lang="en-US" dirty="0"/>
+              <a:t>Other attacks</a:t>
+            </a:r>
+          </a:p>
+        </p:txBody>
+      </p:sp>
+      <p:sp>
+        <p:nvSpPr>
+          <p:cNvPr id="3" name="Content Placeholder 2"/>
+          <p:cNvSpPr>
+            <a:spLocks noGrp="1"/>
+          </p:cNvSpPr>
+          <p:nvPr>
+            <p:ph idx="1"/>
+          </p:nvPr>
+        </p:nvSpPr>
+        <p:spPr/>
+        <p:txBody>
+          <a:bodyPr/>
+          <a:lstStyle/>
+          <a:p>
+            <a:r>
+              <a:rPr lang="en-US" sz="2400" dirty="0"/>
+              <a:t>Time based SQL Injection attacks</a:t>
+            </a:r>
+          </a:p>
+          <a:p>
+            <a:pPr lvl="1"/>
+            <a:r>
+              <a:rPr lang="en-US" sz="2400" dirty="0"/>
+              <a:t>Instead of figuring HTML output, inject:</a:t>
+            </a:r>
+          </a:p>
+          <a:p>
+            <a:r>
+              <a:rPr lang="en-US" sz="2400" dirty="0"/>
+              <a:t>Encoding based</a:t>
+            </a:r>
+          </a:p>
+          <a:p>
+            <a:r>
+              <a:rPr lang="en-US" sz="2400" dirty="0"/>
+              <a:t>More</a:t>
+            </a:r>
+          </a:p>
+          <a:p>
+            <a:pPr lvl="1"/>
+            <a:endParaRPr lang="en-US" dirty="0"/>
+          </a:p>
+        </p:txBody>
+      </p:sp>
+      <p:sp>
+        <p:nvSpPr>
+          <p:cNvPr id="4" name="Rectangle 1"/>
+          <p:cNvSpPr>
+            <a:spLocks noChangeArrowheads="1"/>
+          </p:cNvSpPr>
+          <p:nvPr/>
+        </p:nvSpPr>
+        <p:spPr bwMode="auto">
+          <a:xfrm>
+            <a:off x="6198636" y="3427707"/>
+            <a:ext cx="4329405" cy="400110"/>
+          </a:xfrm>
+          <a:prstGeom prst="rect">
+            <a:avLst/>
+          </a:prstGeom>
+          <a:solidFill>
+            <a:srgbClr val="F9F9F9"/>
+          </a:solidFill>
+          <a:ln>
+            <a:noFill/>
+          </a:ln>
+          <a:effectLst/>
+          <a:extLst>
+            <a:ext uri="{91240B29-F687-4F45-9708-019B960494DF}">
+              <a14:hiddenLine xmlns:a14="http://schemas.microsoft.com/office/drawing/2010/main" w="9525">
+                <a:solidFill>
+                  <a:schemeClr val="tx1"/>
+                </a:solidFill>
+                <a:miter lim="800000"/>
+                <a:headEnd/>
+                <a:tailEnd/>
+              </a14:hiddenLine>
+            </a:ext>
+            <a:ext uri="{AF507438-7753-43E0-B8FC-AC1667EBCBE1}">
+              <a14:hiddenEffects xmlns:a14="http://schemas.microsoft.com/office/drawing/2010/main">
+                <a:effectLst>
+                  <a:outerShdw dist="35921" dir="2700000" algn="ctr" rotWithShape="0">
+                    <a:schemeClr val="bg2"/>
+                  </a:outerShdw>
+                </a:effectLst>
+              </a14:hiddenEffects>
+            </a:ext>
+          </a:extLst>
+        </p:spPr>
+        <p:txBody>
+          <a:bodyPr vert="horz" wrap="square" lIns="91440" tIns="45720" rIns="91440" bIns="45720" numCol="1" anchor="ctr" anchorCtr="0" compatLnSpc="1">
+            <a:prstTxWarp prst="textNoShape">
+              <a:avLst/>
+            </a:prstTxWarp>
+            <a:spAutoFit/>
+          </a:bodyPr>
+          <a:lstStyle/>
+          <a:p>
+            <a:pPr marL="0" marR="0" lvl="0" indent="0" algn="l" defTabSz="914400" rtl="0" eaLnBrk="0" fontAlgn="base" latinLnBrk="0" hangingPunct="0">
+              <a:lnSpc>
+                <a:spcPct val="100000"/>
+              </a:lnSpc>
+              <a:spcBef>
+                <a:spcPct val="0"/>
+              </a:spcBef>
+              <a:spcAft>
+                <a:spcPct val="0"/>
+              </a:spcAft>
+              <a:buClrTx/>
+              <a:buSzTx/>
+              <a:buFontTx/>
+              <a:buNone/>
+              <a:tabLst/>
+            </a:pPr>
+            <a:r>
+              <a:rPr kumimoji="0" lang="en-US" altLang="en-US" sz="2000" b="0" i="0" u="none" strike="noStrike" cap="none" normalizeH="0" baseline="0" dirty="0" err="1">
+                <a:ln>
+                  <a:noFill/>
+                </a:ln>
+                <a:solidFill>
+                  <a:srgbClr val="000000"/>
+                </a:solidFill>
+                <a:effectLst/>
+                <a:latin typeface="Courier New" panose="02070309020205020404" pitchFamily="49" charset="0"/>
+              </a:rPr>
+              <a:t>waitfor</a:t>
+            </a:r>
+            <a:r>
+              <a:rPr kumimoji="0" lang="en-US" altLang="en-US" sz="2000" b="0" i="0" u="none" strike="noStrike" cap="none" normalizeH="0" baseline="0" dirty="0">
+                <a:ln>
+                  <a:noFill/>
+                </a:ln>
+                <a:solidFill>
+                  <a:srgbClr val="000000"/>
+                </a:solidFill>
+                <a:effectLst/>
+                <a:latin typeface="Courier New" panose="02070309020205020404" pitchFamily="49" charset="0"/>
+              </a:rPr>
+              <a:t> delay '00:00:10'--</a:t>
+            </a:r>
+            <a:r>
+              <a:rPr kumimoji="0" lang="en-US" altLang="en-US" sz="2000" b="0" i="0" u="none" strike="noStrike" cap="none" normalizeH="0" baseline="0" dirty="0">
+                <a:ln>
+                  <a:noFill/>
+                </a:ln>
+                <a:solidFill>
+                  <a:schemeClr val="tx1"/>
+                </a:solidFill>
+                <a:effectLst/>
+              </a:rPr>
+              <a:t> </a:t>
+            </a:r>
+            <a:endParaRPr kumimoji="0" lang="en-US" altLang="en-US" sz="2000" b="0" i="0" u="none" strike="noStrike" cap="none" normalizeH="0" baseline="0" dirty="0">
+              <a:ln>
+                <a:noFill/>
+              </a:ln>
+              <a:solidFill>
+                <a:schemeClr val="tx1"/>
+              </a:solidFill>
+              <a:effectLst/>
+              <a:latin typeface="Arial" panose="020B0604020202020204" pitchFamily="34" charset="0"/>
+            </a:endParaRPr>
+          </a:p>
+        </p:txBody>
+      </p:sp>
+    </p:spTree>
+    <p:extLst>
+      <p:ext uri="{BB962C8B-B14F-4D97-AF65-F5344CB8AC3E}">
+        <p14:creationId xmlns:p14="http://schemas.microsoft.com/office/powerpoint/2010/main" val="3239466746"/>
+      </p:ext>
+    </p:extLst>
+  </p:cSld>
+  <p:clrMapOvr>
+    <a:masterClrMapping/>
+  </p:clrMapOvr>
+</p:sld>
+</file>
+
+<file path=ppt/slides/slide22.xml><?xml version="1.0" encoding="utf-8"?>
 <p:sld xmlns:a="http://schemas.openxmlformats.org/drawingml/2006/main" xmlns:r="http://schemas.openxmlformats.org/officeDocument/2006/relationships" xmlns:p="http://schemas.openxmlformats.org/presentationml/2006/main">
   <p:cSld>
     <p:spTree>
@@ -8591,7 +9686,7 @@
 </p:sld>
 </file>
 
-<file path=ppt/slides/slide21.xml><?xml version="1.0" encoding="utf-8"?>
+<file path=ppt/slides/slide23.xml><?xml version="1.0" encoding="utf-8"?>
 <p:sld xmlns:a="http://schemas.openxmlformats.org/drawingml/2006/main" xmlns:r="http://schemas.openxmlformats.org/officeDocument/2006/relationships" xmlns:p="http://schemas.openxmlformats.org/presentationml/2006/main">
   <p:cSld>
     <p:spTree>
@@ -8715,7 +9810,7 @@
 </p:sld>
 </file>
 
-<file path=ppt/slides/slide22.xml><?xml version="1.0" encoding="utf-8"?>
+<file path=ppt/slides/slide24.xml><?xml version="1.0" encoding="utf-8"?>
 <p:sld xmlns:a="http://schemas.openxmlformats.org/drawingml/2006/main" xmlns:r="http://schemas.openxmlformats.org/officeDocument/2006/relationships" xmlns:p="http://schemas.openxmlformats.org/presentationml/2006/main">
   <p:cSld>
     <p:spTree>
@@ -8890,7 +9985,7 @@
 </p:sld>
 </file>
 
-<file path=ppt/slides/slide23.xml><?xml version="1.0" encoding="utf-8"?>
+<file path=ppt/slides/slide25.xml><?xml version="1.0" encoding="utf-8"?>
 <p:sld xmlns:a="http://schemas.openxmlformats.org/drawingml/2006/main" xmlns:r="http://schemas.openxmlformats.org/officeDocument/2006/relationships" xmlns:p="http://schemas.openxmlformats.org/presentationml/2006/main">
   <p:cSld>
     <p:spTree>
@@ -9007,6 +10102,692 @@
 </file>
 
 <file path=ppt/slides/slide3.xml><?xml version="1.0" encoding="utf-8"?>
+<p:sld xmlns:a="http://schemas.openxmlformats.org/drawingml/2006/main" xmlns:r="http://schemas.openxmlformats.org/officeDocument/2006/relationships" xmlns:p="http://schemas.openxmlformats.org/presentationml/2006/main">
+  <p:cSld>
+    <p:spTree>
+      <p:nvGrpSpPr>
+        <p:cNvPr id="1" name=""/>
+        <p:cNvGrpSpPr/>
+        <p:nvPr/>
+      </p:nvGrpSpPr>
+      <p:grpSpPr>
+        <a:xfrm>
+          <a:off x="0" y="0"/>
+          <a:ext cx="0" cy="0"/>
+          <a:chOff x="0" y="0"/>
+          <a:chExt cx="0" cy="0"/>
+        </a:xfrm>
+      </p:grpSpPr>
+      <p:sp>
+        <p:nvSpPr>
+          <p:cNvPr id="2" name="Title 1"/>
+          <p:cNvSpPr>
+            <a:spLocks noGrp="1"/>
+          </p:cNvSpPr>
+          <p:nvPr>
+            <p:ph type="title"/>
+          </p:nvPr>
+        </p:nvSpPr>
+        <p:spPr/>
+        <p:txBody>
+          <a:bodyPr/>
+          <a:lstStyle/>
+          <a:p>
+            <a:r>
+              <a:rPr lang="en-US" dirty="0"/>
+              <a:t>Other cool news</a:t>
+            </a:r>
+          </a:p>
+        </p:txBody>
+      </p:sp>
+      <p:sp>
+        <p:nvSpPr>
+          <p:cNvPr id="3" name="Content Placeholder 2"/>
+          <p:cNvSpPr>
+            <a:spLocks noGrp="1"/>
+          </p:cNvSpPr>
+          <p:nvPr>
+            <p:ph idx="1"/>
+          </p:nvPr>
+        </p:nvSpPr>
+        <p:spPr/>
+        <p:txBody>
+          <a:bodyPr/>
+          <a:lstStyle/>
+          <a:p>
+            <a:r>
+              <a:rPr lang="en-US" dirty="0"/>
+              <a:t>Google says bye to HTTP</a:t>
+            </a:r>
+          </a:p>
+          <a:p>
+            <a:r>
+              <a:rPr lang="en-US" dirty="0"/>
+              <a:t>No Patch from Oracle yet!</a:t>
+            </a:r>
+          </a:p>
+          <a:p>
+            <a:endParaRPr lang="en-US" dirty="0"/>
+          </a:p>
+          <a:p>
+            <a:endParaRPr lang="en-US" dirty="0"/>
+          </a:p>
+        </p:txBody>
+      </p:sp>
+      <p:pic>
+        <p:nvPicPr>
+          <p:cNvPr id="5" name="Picture 4"/>
+          <p:cNvPicPr>
+            <a:picLocks noChangeAspect="1"/>
+          </p:cNvPicPr>
+          <p:nvPr/>
+        </p:nvPicPr>
+        <p:blipFill>
+          <a:blip r:embed="rId3"/>
+          <a:stretch>
+            <a:fillRect/>
+          </a:stretch>
+        </p:blipFill>
+        <p:spPr>
+          <a:xfrm>
+            <a:off x="155384" y="4019647"/>
+            <a:ext cx="6034400" cy="1552575"/>
+          </a:xfrm>
+          <a:prstGeom prst="rect">
+            <a:avLst/>
+          </a:prstGeom>
+        </p:spPr>
+      </p:pic>
+      <p:pic>
+        <p:nvPicPr>
+          <p:cNvPr id="6" name="Picture 5"/>
+          <p:cNvPicPr>
+            <a:picLocks noChangeAspect="1"/>
+          </p:cNvPicPr>
+          <p:nvPr/>
+        </p:nvPicPr>
+        <p:blipFill>
+          <a:blip r:embed="rId4"/>
+          <a:stretch>
+            <a:fillRect/>
+          </a:stretch>
+        </p:blipFill>
+        <p:spPr>
+          <a:xfrm>
+            <a:off x="6292663" y="2039816"/>
+            <a:ext cx="5318144" cy="4554834"/>
+          </a:xfrm>
+          <a:prstGeom prst="rect">
+            <a:avLst/>
+          </a:prstGeom>
+        </p:spPr>
+      </p:pic>
+    </p:spTree>
+    <p:extLst>
+      <p:ext uri="{BB962C8B-B14F-4D97-AF65-F5344CB8AC3E}">
+        <p14:creationId xmlns:p14="http://schemas.microsoft.com/office/powerpoint/2010/main" val="889735966"/>
+      </p:ext>
+    </p:extLst>
+  </p:cSld>
+  <p:clrMapOvr>
+    <a:masterClrMapping/>
+  </p:clrMapOvr>
+  <p:timing>
+    <p:tnLst>
+      <p:par>
+        <p:cTn id="1" dur="indefinite" restart="never" nodeType="tmRoot">
+          <p:childTnLst>
+            <p:seq concurrent="1" nextAc="seek">
+              <p:cTn id="2" dur="indefinite" nodeType="mainSeq">
+                <p:childTnLst>
+                  <p:par>
+                    <p:cTn id="3" fill="hold">
+                      <p:stCondLst>
+                        <p:cond delay="indefinite"/>
+                      </p:stCondLst>
+                      <p:childTnLst>
+                        <p:par>
+                          <p:cTn id="4" fill="hold">
+                            <p:stCondLst>
+                              <p:cond delay="0"/>
+                            </p:stCondLst>
+                            <p:childTnLst>
+                              <p:par>
+                                <p:cTn id="5" presetID="1" presetClass="entr" presetSubtype="0" fill="hold" grpId="0" nodeType="clickEffect">
+                                  <p:stCondLst>
+                                    <p:cond delay="0"/>
+                                  </p:stCondLst>
+                                  <p:childTnLst>
+                                    <p:set>
+                                      <p:cBhvr>
+                                        <p:cTn id="6" dur="1" fill="hold">
+                                          <p:stCondLst>
+                                            <p:cond delay="0"/>
+                                          </p:stCondLst>
+                                        </p:cTn>
+                                        <p:tgtEl>
+                                          <p:spTgt spid="3">
+                                            <p:txEl>
+                                              <p:pRg st="0" end="0"/>
+                                            </p:txEl>
+                                          </p:spTgt>
+                                        </p:tgtEl>
+                                        <p:attrNameLst>
+                                          <p:attrName>style.visibility</p:attrName>
+                                        </p:attrNameLst>
+                                      </p:cBhvr>
+                                      <p:to>
+                                        <p:strVal val="visible"/>
+                                      </p:to>
+                                    </p:set>
+                                  </p:childTnLst>
+                                </p:cTn>
+                              </p:par>
+                            </p:childTnLst>
+                          </p:cTn>
+                        </p:par>
+                      </p:childTnLst>
+                    </p:cTn>
+                  </p:par>
+                  <p:par>
+                    <p:cTn id="7" fill="hold">
+                      <p:stCondLst>
+                        <p:cond delay="indefinite"/>
+                      </p:stCondLst>
+                      <p:childTnLst>
+                        <p:par>
+                          <p:cTn id="8" fill="hold">
+                            <p:stCondLst>
+                              <p:cond delay="0"/>
+                            </p:stCondLst>
+                            <p:childTnLst>
+                              <p:par>
+                                <p:cTn id="9" presetID="1" presetClass="entr" presetSubtype="0" fill="hold" nodeType="clickEffect">
+                                  <p:stCondLst>
+                                    <p:cond delay="0"/>
+                                  </p:stCondLst>
+                                  <p:childTnLst>
+                                    <p:set>
+                                      <p:cBhvr>
+                                        <p:cTn id="10" dur="1" fill="hold">
+                                          <p:stCondLst>
+                                            <p:cond delay="0"/>
+                                          </p:stCondLst>
+                                        </p:cTn>
+                                        <p:tgtEl>
+                                          <p:spTgt spid="6"/>
+                                        </p:tgtEl>
+                                        <p:attrNameLst>
+                                          <p:attrName>style.visibility</p:attrName>
+                                        </p:attrNameLst>
+                                      </p:cBhvr>
+                                      <p:to>
+                                        <p:strVal val="visible"/>
+                                      </p:to>
+                                    </p:set>
+                                  </p:childTnLst>
+                                </p:cTn>
+                              </p:par>
+                            </p:childTnLst>
+                          </p:cTn>
+                        </p:par>
+                      </p:childTnLst>
+                    </p:cTn>
+                  </p:par>
+                  <p:par>
+                    <p:cTn id="11" fill="hold">
+                      <p:stCondLst>
+                        <p:cond delay="indefinite"/>
+                      </p:stCondLst>
+                      <p:childTnLst>
+                        <p:par>
+                          <p:cTn id="12" fill="hold">
+                            <p:stCondLst>
+                              <p:cond delay="0"/>
+                            </p:stCondLst>
+                            <p:childTnLst>
+                              <p:par>
+                                <p:cTn id="13" presetID="1" presetClass="entr" presetSubtype="0" fill="hold" grpId="0" nodeType="clickEffect">
+                                  <p:stCondLst>
+                                    <p:cond delay="0"/>
+                                  </p:stCondLst>
+                                  <p:childTnLst>
+                                    <p:set>
+                                      <p:cBhvr>
+                                        <p:cTn id="14" dur="1" fill="hold">
+                                          <p:stCondLst>
+                                            <p:cond delay="0"/>
+                                          </p:stCondLst>
+                                        </p:cTn>
+                                        <p:tgtEl>
+                                          <p:spTgt spid="3">
+                                            <p:txEl>
+                                              <p:pRg st="1" end="1"/>
+                                            </p:txEl>
+                                          </p:spTgt>
+                                        </p:tgtEl>
+                                        <p:attrNameLst>
+                                          <p:attrName>style.visibility</p:attrName>
+                                        </p:attrNameLst>
+                                      </p:cBhvr>
+                                      <p:to>
+                                        <p:strVal val="visible"/>
+                                      </p:to>
+                                    </p:set>
+                                  </p:childTnLst>
+                                </p:cTn>
+                              </p:par>
+                              <p:par>
+                                <p:cTn id="15" presetID="1" presetClass="entr" presetSubtype="0" fill="hold" nodeType="withEffect">
+                                  <p:stCondLst>
+                                    <p:cond delay="0"/>
+                                  </p:stCondLst>
+                                  <p:childTnLst>
+                                    <p:set>
+                                      <p:cBhvr>
+                                        <p:cTn id="16" dur="1" fill="hold">
+                                          <p:stCondLst>
+                                            <p:cond delay="0"/>
+                                          </p:stCondLst>
+                                        </p:cTn>
+                                        <p:tgtEl>
+                                          <p:spTgt spid="5"/>
+                                        </p:tgtEl>
+                                        <p:attrNameLst>
+                                          <p:attrName>style.visibility</p:attrName>
+                                        </p:attrNameLst>
+                                      </p:cBhvr>
+                                      <p:to>
+                                        <p:strVal val="visible"/>
+                                      </p:to>
+                                    </p:set>
+                                  </p:childTnLst>
+                                </p:cTn>
+                              </p:par>
+                            </p:childTnLst>
+                          </p:cTn>
+                        </p:par>
+                      </p:childTnLst>
+                    </p:cTn>
+                  </p:par>
+                </p:childTnLst>
+              </p:cTn>
+              <p:prevCondLst>
+                <p:cond evt="onPrev" delay="0">
+                  <p:tgtEl>
+                    <p:sldTgt/>
+                  </p:tgtEl>
+                </p:cond>
+              </p:prevCondLst>
+              <p:nextCondLst>
+                <p:cond evt="onNext" delay="0">
+                  <p:tgtEl>
+                    <p:sldTgt/>
+                  </p:tgtEl>
+                </p:cond>
+              </p:nextCondLst>
+            </p:seq>
+          </p:childTnLst>
+        </p:cTn>
+      </p:par>
+    </p:tnLst>
+    <p:bldLst>
+      <p:bldP spid="3" grpId="0" uiExpand="1" build="p"/>
+    </p:bldLst>
+  </p:timing>
+</p:sld>
+</file>
+
+<file path=ppt/slides/slide4.xml><?xml version="1.0" encoding="utf-8"?>
+<p:sld xmlns:a="http://schemas.openxmlformats.org/drawingml/2006/main" xmlns:r="http://schemas.openxmlformats.org/officeDocument/2006/relationships" xmlns:p="http://schemas.openxmlformats.org/presentationml/2006/main">
+  <p:cSld>
+    <p:spTree>
+      <p:nvGrpSpPr>
+        <p:cNvPr id="1" name=""/>
+        <p:cNvGrpSpPr/>
+        <p:nvPr/>
+      </p:nvGrpSpPr>
+      <p:grpSpPr>
+        <a:xfrm>
+          <a:off x="0" y="0"/>
+          <a:ext cx="0" cy="0"/>
+          <a:chOff x="0" y="0"/>
+          <a:chExt cx="0" cy="0"/>
+        </a:xfrm>
+      </p:grpSpPr>
+      <p:sp>
+        <p:nvSpPr>
+          <p:cNvPr id="2" name="Title 1"/>
+          <p:cNvSpPr>
+            <a:spLocks noGrp="1"/>
+          </p:cNvSpPr>
+          <p:nvPr>
+            <p:ph type="title"/>
+          </p:nvPr>
+        </p:nvSpPr>
+        <p:spPr/>
+        <p:txBody>
+          <a:bodyPr/>
+          <a:lstStyle/>
+          <a:p>
+            <a:r>
+              <a:rPr lang="en-US" dirty="0"/>
+              <a:t>3 Types of </a:t>
+            </a:r>
+            <a:r>
+              <a:rPr lang="en-US" dirty="0" err="1"/>
+              <a:t>sql</a:t>
+            </a:r>
+            <a:r>
+              <a:rPr lang="en-US" dirty="0"/>
+              <a:t> injection</a:t>
+            </a:r>
+          </a:p>
+        </p:txBody>
+      </p:sp>
+      <p:sp>
+        <p:nvSpPr>
+          <p:cNvPr id="3" name="Content Placeholder 2"/>
+          <p:cNvSpPr>
+            <a:spLocks noGrp="1"/>
+          </p:cNvSpPr>
+          <p:nvPr>
+            <p:ph idx="1"/>
+          </p:nvPr>
+        </p:nvSpPr>
+        <p:spPr>
+          <a:xfrm>
+            <a:off x="2736563" y="2087190"/>
+            <a:ext cx="11029615" cy="3678303"/>
+          </a:xfrm>
+        </p:spPr>
+        <p:txBody>
+          <a:bodyPr>
+            <a:normAutofit/>
+          </a:bodyPr>
+          <a:lstStyle/>
+          <a:p>
+            <a:r>
+              <a:rPr lang="en-US" sz="3600" dirty="0"/>
+              <a:t>Simple</a:t>
+            </a:r>
+          </a:p>
+          <a:p>
+            <a:r>
+              <a:rPr lang="en-US" sz="3600" dirty="0"/>
+              <a:t>Error based</a:t>
+            </a:r>
+          </a:p>
+          <a:p>
+            <a:r>
+              <a:rPr lang="en-US" sz="3600" dirty="0"/>
+              <a:t>Blind</a:t>
+            </a:r>
+          </a:p>
+        </p:txBody>
+      </p:sp>
+      <p:pic>
+        <p:nvPicPr>
+          <p:cNvPr id="1026" name="Picture 2" descr="http://www.mobafire.com/images/champion/icon/lee-sin.png"/>
+          <p:cNvPicPr>
+            <a:picLocks noChangeAspect="1" noChangeArrowheads="1"/>
+          </p:cNvPicPr>
+          <p:nvPr/>
+        </p:nvPicPr>
+        <p:blipFill>
+          <a:blip r:embed="rId3">
+            <a:extLst>
+              <a:ext uri="{28A0092B-C50C-407E-A947-70E740481C1C}">
+                <a14:useLocalDpi xmlns:a14="http://schemas.microsoft.com/office/drawing/2010/main" val="0"/>
+              </a:ext>
+            </a:extLst>
+          </a:blip>
+          <a:srcRect/>
+          <a:stretch>
+            <a:fillRect/>
+          </a:stretch>
+        </p:blipFill>
+        <p:spPr bwMode="auto">
+          <a:xfrm>
+            <a:off x="4363680" y="4410220"/>
+            <a:ext cx="1143000" cy="1143001"/>
+          </a:xfrm>
+          <a:prstGeom prst="rect">
+            <a:avLst/>
+          </a:prstGeom>
+          <a:noFill/>
+          <a:extLst>
+            <a:ext uri="{909E8E84-426E-40DD-AFC4-6F175D3DCCD1}">
+              <a14:hiddenFill xmlns:a14="http://schemas.microsoft.com/office/drawing/2010/main">
+                <a:solidFill>
+                  <a:srgbClr val="FFFFFF"/>
+                </a:solidFill>
+              </a14:hiddenFill>
+            </a:ext>
+          </a:extLst>
+        </p:spPr>
+      </p:pic>
+    </p:spTree>
+    <p:extLst>
+      <p:ext uri="{BB962C8B-B14F-4D97-AF65-F5344CB8AC3E}">
+        <p14:creationId xmlns:p14="http://schemas.microsoft.com/office/powerpoint/2010/main" val="2243770139"/>
+      </p:ext>
+    </p:extLst>
+  </p:cSld>
+  <p:clrMapOvr>
+    <a:masterClrMapping/>
+  </p:clrMapOvr>
+  <p:timing>
+    <p:tnLst>
+      <p:par>
+        <p:cTn id="1" dur="indefinite" restart="never" nodeType="tmRoot">
+          <p:childTnLst>
+            <p:seq concurrent="1" nextAc="seek">
+              <p:cTn id="2" dur="indefinite" nodeType="mainSeq">
+                <p:childTnLst>
+                  <p:par>
+                    <p:cTn id="3" fill="hold">
+                      <p:stCondLst>
+                        <p:cond delay="indefinite"/>
+                      </p:stCondLst>
+                      <p:childTnLst>
+                        <p:par>
+                          <p:cTn id="4" fill="hold">
+                            <p:stCondLst>
+                              <p:cond delay="0"/>
+                            </p:stCondLst>
+                            <p:childTnLst>
+                              <p:par>
+                                <p:cTn id="5" presetID="1" presetClass="entr" presetSubtype="0" fill="hold" grpId="0" nodeType="clickEffect">
+                                  <p:stCondLst>
+                                    <p:cond delay="0"/>
+                                  </p:stCondLst>
+                                  <p:childTnLst>
+                                    <p:set>
+                                      <p:cBhvr>
+                                        <p:cTn id="6" dur="1" fill="hold">
+                                          <p:stCondLst>
+                                            <p:cond delay="0"/>
+                                          </p:stCondLst>
+                                        </p:cTn>
+                                        <p:tgtEl>
+                                          <p:spTgt spid="3">
+                                            <p:txEl>
+                                              <p:pRg st="0" end="0"/>
+                                            </p:txEl>
+                                          </p:spTgt>
+                                        </p:tgtEl>
+                                        <p:attrNameLst>
+                                          <p:attrName>style.visibility</p:attrName>
+                                        </p:attrNameLst>
+                                      </p:cBhvr>
+                                      <p:to>
+                                        <p:strVal val="visible"/>
+                                      </p:to>
+                                    </p:set>
+                                  </p:childTnLst>
+                                </p:cTn>
+                              </p:par>
+                            </p:childTnLst>
+                          </p:cTn>
+                        </p:par>
+                      </p:childTnLst>
+                    </p:cTn>
+                  </p:par>
+                  <p:par>
+                    <p:cTn id="7" fill="hold">
+                      <p:stCondLst>
+                        <p:cond delay="indefinite"/>
+                      </p:stCondLst>
+                      <p:childTnLst>
+                        <p:par>
+                          <p:cTn id="8" fill="hold">
+                            <p:stCondLst>
+                              <p:cond delay="0"/>
+                            </p:stCondLst>
+                            <p:childTnLst>
+                              <p:par>
+                                <p:cTn id="9" presetID="1" presetClass="entr" presetSubtype="0" fill="hold" grpId="0" nodeType="clickEffect">
+                                  <p:stCondLst>
+                                    <p:cond delay="0"/>
+                                  </p:stCondLst>
+                                  <p:childTnLst>
+                                    <p:set>
+                                      <p:cBhvr>
+                                        <p:cTn id="10" dur="1" fill="hold">
+                                          <p:stCondLst>
+                                            <p:cond delay="0"/>
+                                          </p:stCondLst>
+                                        </p:cTn>
+                                        <p:tgtEl>
+                                          <p:spTgt spid="3">
+                                            <p:txEl>
+                                              <p:pRg st="1" end="1"/>
+                                            </p:txEl>
+                                          </p:spTgt>
+                                        </p:tgtEl>
+                                        <p:attrNameLst>
+                                          <p:attrName>style.visibility</p:attrName>
+                                        </p:attrNameLst>
+                                      </p:cBhvr>
+                                      <p:to>
+                                        <p:strVal val="visible"/>
+                                      </p:to>
+                                    </p:set>
+                                  </p:childTnLst>
+                                </p:cTn>
+                              </p:par>
+                            </p:childTnLst>
+                          </p:cTn>
+                        </p:par>
+                      </p:childTnLst>
+                    </p:cTn>
+                  </p:par>
+                  <p:par>
+                    <p:cTn id="11" fill="hold">
+                      <p:stCondLst>
+                        <p:cond delay="indefinite"/>
+                      </p:stCondLst>
+                      <p:childTnLst>
+                        <p:par>
+                          <p:cTn id="12" fill="hold">
+                            <p:stCondLst>
+                              <p:cond delay="0"/>
+                            </p:stCondLst>
+                            <p:childTnLst>
+                              <p:par>
+                                <p:cTn id="13" presetID="1" presetClass="entr" presetSubtype="0" fill="hold" grpId="0" nodeType="clickEffect">
+                                  <p:stCondLst>
+                                    <p:cond delay="0"/>
+                                  </p:stCondLst>
+                                  <p:childTnLst>
+                                    <p:set>
+                                      <p:cBhvr>
+                                        <p:cTn id="14" dur="1" fill="hold">
+                                          <p:stCondLst>
+                                            <p:cond delay="0"/>
+                                          </p:stCondLst>
+                                        </p:cTn>
+                                        <p:tgtEl>
+                                          <p:spTgt spid="3">
+                                            <p:txEl>
+                                              <p:pRg st="2" end="2"/>
+                                            </p:txEl>
+                                          </p:spTgt>
+                                        </p:tgtEl>
+                                        <p:attrNameLst>
+                                          <p:attrName>style.visibility</p:attrName>
+                                        </p:attrNameLst>
+                                      </p:cBhvr>
+                                      <p:to>
+                                        <p:strVal val="visible"/>
+                                      </p:to>
+                                    </p:set>
+                                  </p:childTnLst>
+                                </p:cTn>
+                              </p:par>
+                              <p:par>
+                                <p:cTn id="15" presetID="1" presetClass="entr" presetSubtype="0" fill="hold" nodeType="withEffect">
+                                  <p:stCondLst>
+                                    <p:cond delay="0"/>
+                                  </p:stCondLst>
+                                  <p:childTnLst>
+                                    <p:set>
+                                      <p:cBhvr>
+                                        <p:cTn id="16" dur="1" fill="hold">
+                                          <p:stCondLst>
+                                            <p:cond delay="0"/>
+                                          </p:stCondLst>
+                                        </p:cTn>
+                                        <p:tgtEl>
+                                          <p:spTgt spid="1026"/>
+                                        </p:tgtEl>
+                                        <p:attrNameLst>
+                                          <p:attrName>style.visibility</p:attrName>
+                                        </p:attrNameLst>
+                                      </p:cBhvr>
+                                      <p:to>
+                                        <p:strVal val="visible"/>
+                                      </p:to>
+                                    </p:set>
+                                  </p:childTnLst>
+                                </p:cTn>
+                              </p:par>
+                            </p:childTnLst>
+                          </p:cTn>
+                        </p:par>
+                      </p:childTnLst>
+                    </p:cTn>
+                  </p:par>
+                </p:childTnLst>
+              </p:cTn>
+              <p:prevCondLst>
+                <p:cond evt="onPrev" delay="0">
+                  <p:tgtEl>
+                    <p:sldTgt/>
+                  </p:tgtEl>
+                </p:cond>
+              </p:prevCondLst>
+              <p:nextCondLst>
+                <p:cond evt="onNext" delay="0">
+                  <p:tgtEl>
+                    <p:sldTgt/>
+                  </p:tgtEl>
+                </p:cond>
+              </p:nextCondLst>
+            </p:seq>
+          </p:childTnLst>
+        </p:cTn>
+      </p:par>
+    </p:tnLst>
+    <p:bldLst>
+      <p:bldP spid="3" grpId="0" build="p"/>
+    </p:bldLst>
+  </p:timing>
+</p:sld>
+</file>
+
+<file path=ppt/slides/slide5.xml><?xml version="1.0" encoding="utf-8"?>
 <p:sld xmlns:a="http://schemas.openxmlformats.org/drawingml/2006/main" xmlns:r="http://schemas.openxmlformats.org/officeDocument/2006/relationships" xmlns:p="http://schemas.openxmlformats.org/presentationml/2006/main">
   <p:cSld>
     <p:spTree>
@@ -9138,7 +10919,7 @@
 </p:sld>
 </file>
 
-<file path=ppt/slides/slide4.xml><?xml version="1.0" encoding="utf-8"?>
+<file path=ppt/slides/slide6.xml><?xml version="1.0" encoding="utf-8"?>
 <p:sld xmlns:a="http://schemas.openxmlformats.org/drawingml/2006/main" xmlns:r="http://schemas.openxmlformats.org/officeDocument/2006/relationships" xmlns:p="http://schemas.openxmlformats.org/presentationml/2006/main">
   <p:cSld>
     <p:spTree>
@@ -9214,7 +10995,7 @@
 </p:sld>
 </file>
 
-<file path=ppt/slides/slide5.xml><?xml version="1.0" encoding="utf-8"?>
+<file path=ppt/slides/slide7.xml><?xml version="1.0" encoding="utf-8"?>
 <p:sld xmlns:a="http://schemas.openxmlformats.org/drawingml/2006/main" xmlns:r="http://schemas.openxmlformats.org/officeDocument/2006/relationships" xmlns:p="http://schemas.openxmlformats.org/presentationml/2006/main">
   <p:cSld>
     <p:spTree>
@@ -9997,7 +11778,7 @@
 </p:sld>
 </file>
 
-<file path=ppt/slides/slide6.xml><?xml version="1.0" encoding="utf-8"?>
+<file path=ppt/slides/slide8.xml><?xml version="1.0" encoding="utf-8"?>
 <p:sld xmlns:a="http://schemas.openxmlformats.org/drawingml/2006/main" xmlns:r="http://schemas.openxmlformats.org/officeDocument/2006/relationships" xmlns:p="http://schemas.openxmlformats.org/presentationml/2006/main">
   <p:cSld>
     <p:spTree>
@@ -10837,682 +12618,6 @@
 </p:sld>
 </file>
 
-<file path=ppt/slides/slide7.xml><?xml version="1.0" encoding="utf-8"?>
-<p:sld xmlns:a="http://schemas.openxmlformats.org/drawingml/2006/main" xmlns:r="http://schemas.openxmlformats.org/officeDocument/2006/relationships" xmlns:p="http://schemas.openxmlformats.org/presentationml/2006/main">
-  <p:cSld>
-    <p:spTree>
-      <p:nvGrpSpPr>
-        <p:cNvPr id="1" name=""/>
-        <p:cNvGrpSpPr/>
-        <p:nvPr/>
-      </p:nvGrpSpPr>
-      <p:grpSpPr>
-        <a:xfrm>
-          <a:off x="0" y="0"/>
-          <a:ext cx="0" cy="0"/>
-          <a:chOff x="0" y="0"/>
-          <a:chExt cx="0" cy="0"/>
-        </a:xfrm>
-      </p:grpSpPr>
-      <p:sp>
-        <p:nvSpPr>
-          <p:cNvPr id="2" name="Title 1"/>
-          <p:cNvSpPr>
-            <a:spLocks noGrp="1"/>
-          </p:cNvSpPr>
-          <p:nvPr>
-            <p:ph type="title"/>
-          </p:nvPr>
-        </p:nvSpPr>
-        <p:spPr/>
-        <p:txBody>
-          <a:bodyPr/>
-          <a:lstStyle/>
-          <a:p>
-            <a:r>
-              <a:rPr lang="en-US" dirty="0"/>
-              <a:t>SQL 101</a:t>
-            </a:r>
-          </a:p>
-        </p:txBody>
-      </p:sp>
-      <p:sp>
-        <p:nvSpPr>
-          <p:cNvPr id="3" name="Content Placeholder 2"/>
-          <p:cNvSpPr>
-            <a:spLocks noGrp="1"/>
-          </p:cNvSpPr>
-          <p:nvPr>
-            <p:ph idx="1"/>
-          </p:nvPr>
-        </p:nvSpPr>
-        <p:spPr/>
-        <p:txBody>
-          <a:bodyPr/>
-          <a:lstStyle/>
-          <a:p>
-            <a:r>
-              <a:rPr lang="en-US" dirty="0"/>
-              <a:t>Structured Query Language</a:t>
-            </a:r>
-          </a:p>
-          <a:p>
-            <a:r>
-              <a:rPr lang="en-US" dirty="0"/>
-              <a:t>Standard programming language for interacting with databases</a:t>
-            </a:r>
-          </a:p>
-          <a:p>
-            <a:r>
-              <a:rPr lang="en-US" dirty="0"/>
-              <a:t>Example Commands:</a:t>
-            </a:r>
-          </a:p>
-          <a:p>
-            <a:pPr lvl="1"/>
-            <a:r>
-              <a:rPr lang="en-US" dirty="0"/>
-              <a:t>SELECT – retrieve data</a:t>
-            </a:r>
-          </a:p>
-          <a:p>
-            <a:pPr lvl="1"/>
-            <a:r>
-              <a:rPr lang="en-US" dirty="0"/>
-              <a:t>DROP – delete table</a:t>
-            </a:r>
-          </a:p>
-          <a:p>
-            <a:pPr lvl="1"/>
-            <a:r>
-              <a:rPr lang="en-US" dirty="0"/>
-              <a:t>INSERT – add row to table</a:t>
-            </a:r>
-          </a:p>
-          <a:p>
-            <a:pPr lvl="1"/>
-            <a:r>
-              <a:rPr lang="en-US" dirty="0"/>
-              <a:t>UPDATE – modify row in a table</a:t>
-            </a:r>
-          </a:p>
-          <a:p>
-            <a:pPr lvl="1"/>
-            <a:r>
-              <a:rPr lang="en-US" dirty="0"/>
-              <a:t>DELETE – remove row from table</a:t>
-            </a:r>
-          </a:p>
-          <a:p>
-            <a:pPr lvl="1"/>
-            <a:r>
-              <a:rPr lang="en-US" dirty="0"/>
-              <a:t>-- Comments are written with a dash </a:t>
-            </a:r>
-            <a:r>
-              <a:rPr lang="en-US" dirty="0" err="1"/>
-              <a:t>dash</a:t>
-            </a:r>
-            <a:r>
-              <a:rPr lang="en-US" dirty="0"/>
-              <a:t> space in front</a:t>
-            </a:r>
-          </a:p>
-        </p:txBody>
-      </p:sp>
-    </p:spTree>
-    <p:extLst>
-      <p:ext uri="{BB962C8B-B14F-4D97-AF65-F5344CB8AC3E}">
-        <p14:creationId xmlns:p14="http://schemas.microsoft.com/office/powerpoint/2010/main" val="294861346"/>
-      </p:ext>
-    </p:extLst>
-  </p:cSld>
-  <p:clrMapOvr>
-    <a:masterClrMapping/>
-  </p:clrMapOvr>
-</p:sld>
-</file>
-
-<file path=ppt/slides/slide8.xml><?xml version="1.0" encoding="utf-8"?>
-<p:sld xmlns:a="http://schemas.openxmlformats.org/drawingml/2006/main" xmlns:r="http://schemas.openxmlformats.org/officeDocument/2006/relationships" xmlns:p="http://schemas.openxmlformats.org/presentationml/2006/main">
-  <p:cSld>
-    <p:spTree>
-      <p:nvGrpSpPr>
-        <p:cNvPr id="1" name=""/>
-        <p:cNvGrpSpPr/>
-        <p:nvPr/>
-      </p:nvGrpSpPr>
-      <p:grpSpPr>
-        <a:xfrm>
-          <a:off x="0" y="0"/>
-          <a:ext cx="0" cy="0"/>
-          <a:chOff x="0" y="0"/>
-          <a:chExt cx="0" cy="0"/>
-        </a:xfrm>
-      </p:grpSpPr>
-      <p:sp>
-        <p:nvSpPr>
-          <p:cNvPr id="2" name="Title 1"/>
-          <p:cNvSpPr>
-            <a:spLocks noGrp="1"/>
-          </p:cNvSpPr>
-          <p:nvPr>
-            <p:ph type="title"/>
-          </p:nvPr>
-        </p:nvSpPr>
-        <p:spPr/>
-        <p:txBody>
-          <a:bodyPr/>
-          <a:lstStyle/>
-          <a:p>
-            <a:r>
-              <a:rPr lang="en-US" dirty="0"/>
-              <a:t>Sample </a:t>
-            </a:r>
-            <a:r>
-              <a:rPr lang="en-US" dirty="0" err="1"/>
-              <a:t>sql</a:t>
-            </a:r>
-            <a:r>
-              <a:rPr lang="en-US" dirty="0"/>
-              <a:t> statements</a:t>
-            </a:r>
-          </a:p>
-        </p:txBody>
-      </p:sp>
-      <p:pic>
-        <p:nvPicPr>
-          <p:cNvPr id="4" name="Content Placeholder 3"/>
-          <p:cNvPicPr>
-            <a:picLocks noGrp="1" noChangeAspect="1"/>
-          </p:cNvPicPr>
-          <p:nvPr>
-            <p:ph idx="1"/>
-          </p:nvPr>
-        </p:nvPicPr>
-        <p:blipFill>
-          <a:blip r:embed="rId2"/>
-          <a:stretch>
-            <a:fillRect/>
-          </a:stretch>
-        </p:blipFill>
-        <p:spPr>
-          <a:xfrm>
-            <a:off x="4966994" y="1983257"/>
-            <a:ext cx="6067417" cy="3288540"/>
-          </a:xfrm>
-          <a:prstGeom prst="rect">
-            <a:avLst/>
-          </a:prstGeom>
-        </p:spPr>
-      </p:pic>
-      <p:sp>
-        <p:nvSpPr>
-          <p:cNvPr id="5" name="TextBox 4"/>
-          <p:cNvSpPr txBox="1"/>
-          <p:nvPr/>
-        </p:nvSpPr>
-        <p:spPr>
-          <a:xfrm>
-            <a:off x="699796" y="2519265"/>
-            <a:ext cx="4058816" cy="4247317"/>
-          </a:xfrm>
-          <a:prstGeom prst="rect">
-            <a:avLst/>
-          </a:prstGeom>
-          <a:noFill/>
-        </p:spPr>
-        <p:txBody>
-          <a:bodyPr wrap="square" rtlCol="0">
-            <a:spAutoFit/>
-          </a:bodyPr>
-          <a:lstStyle/>
-          <a:p>
-            <a:r>
-              <a:rPr lang="en-US" dirty="0"/>
-              <a:t>&gt;SELECT FIRST_NAME FROM ADDRESS WHERE LAST_NAME=‘Mouse’;</a:t>
-            </a:r>
-          </a:p>
-          <a:p>
-            <a:endParaRPr lang="en-US" dirty="0"/>
-          </a:p>
-          <a:p>
-            <a:r>
-              <a:rPr lang="en-US" dirty="0">
-                <a:solidFill>
-                  <a:srgbClr val="00B050"/>
-                </a:solidFill>
-              </a:rPr>
-              <a:t>&lt;Mickey&gt; </a:t>
-            </a:r>
-          </a:p>
-          <a:p>
-            <a:pPr marL="285750" indent="-285750">
-              <a:buFont typeface="Wingdings" panose="05000000000000000000" pitchFamily="2" charset="2"/>
-              <a:buChar char="Ø"/>
-            </a:pPr>
-            <a:endParaRPr lang="en-US" dirty="0"/>
-          </a:p>
-          <a:p>
-            <a:r>
-              <a:rPr lang="en-US" dirty="0"/>
-              <a:t>&gt;SELECT * FROM ADDRESS WHERE AGE&gt;60;</a:t>
-            </a:r>
-          </a:p>
-          <a:p>
-            <a:endParaRPr lang="en-US" dirty="0"/>
-          </a:p>
-          <a:p>
-            <a:r>
-              <a:rPr lang="en-US" dirty="0">
-                <a:solidFill>
-                  <a:srgbClr val="00B050"/>
-                </a:solidFill>
-              </a:rPr>
-              <a:t>&lt;Mickey, Mouse, 123 Fantasy Way, Anaheim, 73&gt;</a:t>
-            </a:r>
-          </a:p>
-          <a:p>
-            <a:r>
-              <a:rPr lang="en-US" dirty="0">
-                <a:solidFill>
-                  <a:srgbClr val="00B050"/>
-                </a:solidFill>
-              </a:rPr>
-              <a:t>&lt;Donald, Duck, 555 Quack Street, Mallard, 65&gt;</a:t>
-            </a:r>
-          </a:p>
-          <a:p>
-            <a:r>
-              <a:rPr lang="en-US" dirty="0">
-                <a:solidFill>
-                  <a:srgbClr val="00B050"/>
-                </a:solidFill>
-              </a:rPr>
-              <a:t>&lt;Wiley, Coyote, 999 Acme Way, Canyon, 61&gt;</a:t>
-            </a:r>
-          </a:p>
-        </p:txBody>
-      </p:sp>
-      <p:sp>
-        <p:nvSpPr>
-          <p:cNvPr id="6" name="TextBox 5"/>
-          <p:cNvSpPr txBox="1"/>
-          <p:nvPr/>
-        </p:nvSpPr>
-        <p:spPr>
-          <a:xfrm>
-            <a:off x="5458408" y="6055567"/>
-            <a:ext cx="4363182" cy="369332"/>
-          </a:xfrm>
-          <a:prstGeom prst="rect">
-            <a:avLst/>
-          </a:prstGeom>
-          <a:noFill/>
-        </p:spPr>
-        <p:txBody>
-          <a:bodyPr wrap="none" rtlCol="0">
-            <a:spAutoFit/>
-          </a:bodyPr>
-          <a:lstStyle/>
-          <a:p>
-            <a:r>
-              <a:rPr lang="en-US" dirty="0"/>
-              <a:t>&gt;SELECT * FROM ADDRESS WHERE TRUE;</a:t>
-            </a:r>
-          </a:p>
-        </p:txBody>
-      </p:sp>
-    </p:spTree>
-    <p:extLst>
-      <p:ext uri="{BB962C8B-B14F-4D97-AF65-F5344CB8AC3E}">
-        <p14:creationId xmlns:p14="http://schemas.microsoft.com/office/powerpoint/2010/main" val="2510618656"/>
-      </p:ext>
-    </p:extLst>
-  </p:cSld>
-  <p:clrMapOvr>
-    <a:masterClrMapping/>
-  </p:clrMapOvr>
-  <p:timing>
-    <p:tnLst>
-      <p:par>
-        <p:cTn id="1" dur="indefinite" restart="never" nodeType="tmRoot">
-          <p:childTnLst>
-            <p:seq concurrent="1" nextAc="seek">
-              <p:cTn id="2" dur="indefinite" nodeType="mainSeq">
-                <p:childTnLst>
-                  <p:par>
-                    <p:cTn id="3" fill="hold">
-                      <p:stCondLst>
-                        <p:cond delay="indefinite"/>
-                      </p:stCondLst>
-                      <p:childTnLst>
-                        <p:par>
-                          <p:cTn id="4" fill="hold">
-                            <p:stCondLst>
-                              <p:cond delay="0"/>
-                            </p:stCondLst>
-                            <p:childTnLst>
-                              <p:par>
-                                <p:cTn id="5" presetID="1" presetClass="entr" presetSubtype="0" fill="hold" nodeType="clickEffect">
-                                  <p:stCondLst>
-                                    <p:cond delay="0"/>
-                                  </p:stCondLst>
-                                  <p:childTnLst>
-                                    <p:set>
-                                      <p:cBhvr>
-                                        <p:cTn id="6" dur="1" fill="hold">
-                                          <p:stCondLst>
-                                            <p:cond delay="0"/>
-                                          </p:stCondLst>
-                                        </p:cTn>
-                                        <p:tgtEl>
-                                          <p:spTgt spid="5">
-                                            <p:txEl>
-                                              <p:pRg st="0" end="0"/>
-                                            </p:txEl>
-                                          </p:spTgt>
-                                        </p:tgtEl>
-                                        <p:attrNameLst>
-                                          <p:attrName>style.visibility</p:attrName>
-                                        </p:attrNameLst>
-                                      </p:cBhvr>
-                                      <p:to>
-                                        <p:strVal val="visible"/>
-                                      </p:to>
-                                    </p:set>
-                                  </p:childTnLst>
-                                </p:cTn>
-                              </p:par>
-                            </p:childTnLst>
-                          </p:cTn>
-                        </p:par>
-                      </p:childTnLst>
-                    </p:cTn>
-                  </p:par>
-                  <p:par>
-                    <p:cTn id="7" fill="hold">
-                      <p:stCondLst>
-                        <p:cond delay="indefinite"/>
-                      </p:stCondLst>
-                      <p:childTnLst>
-                        <p:par>
-                          <p:cTn id="8" fill="hold">
-                            <p:stCondLst>
-                              <p:cond delay="0"/>
-                            </p:stCondLst>
-                            <p:childTnLst>
-                              <p:par>
-                                <p:cTn id="9" presetID="1" presetClass="entr" presetSubtype="0" fill="hold" nodeType="clickEffect">
-                                  <p:stCondLst>
-                                    <p:cond delay="0"/>
-                                  </p:stCondLst>
-                                  <p:childTnLst>
-                                    <p:set>
-                                      <p:cBhvr>
-                                        <p:cTn id="10" dur="1" fill="hold">
-                                          <p:stCondLst>
-                                            <p:cond delay="0"/>
-                                          </p:stCondLst>
-                                        </p:cTn>
-                                        <p:tgtEl>
-                                          <p:spTgt spid="5">
-                                            <p:txEl>
-                                              <p:pRg st="2" end="2"/>
-                                            </p:txEl>
-                                          </p:spTgt>
-                                        </p:tgtEl>
-                                        <p:attrNameLst>
-                                          <p:attrName>style.visibility</p:attrName>
-                                        </p:attrNameLst>
-                                      </p:cBhvr>
-                                      <p:to>
-                                        <p:strVal val="visible"/>
-                                      </p:to>
-                                    </p:set>
-                                  </p:childTnLst>
-                                </p:cTn>
-                              </p:par>
-                            </p:childTnLst>
-                          </p:cTn>
-                        </p:par>
-                      </p:childTnLst>
-                    </p:cTn>
-                  </p:par>
-                  <p:par>
-                    <p:cTn id="11" fill="hold">
-                      <p:stCondLst>
-                        <p:cond delay="indefinite"/>
-                      </p:stCondLst>
-                      <p:childTnLst>
-                        <p:par>
-                          <p:cTn id="12" fill="hold">
-                            <p:stCondLst>
-                              <p:cond delay="0"/>
-                            </p:stCondLst>
-                            <p:childTnLst>
-                              <p:par>
-                                <p:cTn id="13" presetID="1" presetClass="entr" presetSubtype="0" fill="hold" nodeType="clickEffect">
-                                  <p:stCondLst>
-                                    <p:cond delay="0"/>
-                                  </p:stCondLst>
-                                  <p:childTnLst>
-                                    <p:set>
-                                      <p:cBhvr>
-                                        <p:cTn id="14" dur="1" fill="hold">
-                                          <p:stCondLst>
-                                            <p:cond delay="0"/>
-                                          </p:stCondLst>
-                                        </p:cTn>
-                                        <p:tgtEl>
-                                          <p:spTgt spid="5">
-                                            <p:txEl>
-                                              <p:pRg st="4" end="4"/>
-                                            </p:txEl>
-                                          </p:spTgt>
-                                        </p:tgtEl>
-                                        <p:attrNameLst>
-                                          <p:attrName>style.visibility</p:attrName>
-                                        </p:attrNameLst>
-                                      </p:cBhvr>
-                                      <p:to>
-                                        <p:strVal val="visible"/>
-                                      </p:to>
-                                    </p:set>
-                                  </p:childTnLst>
-                                </p:cTn>
-                              </p:par>
-                            </p:childTnLst>
-                          </p:cTn>
-                        </p:par>
-                      </p:childTnLst>
-                    </p:cTn>
-                  </p:par>
-                  <p:par>
-                    <p:cTn id="15" fill="hold">
-                      <p:stCondLst>
-                        <p:cond delay="indefinite"/>
-                      </p:stCondLst>
-                      <p:childTnLst>
-                        <p:par>
-                          <p:cTn id="16" fill="hold">
-                            <p:stCondLst>
-                              <p:cond delay="0"/>
-                            </p:stCondLst>
-                            <p:childTnLst>
-                              <p:par>
-                                <p:cTn id="17" presetID="1" presetClass="entr" presetSubtype="0" fill="hold" nodeType="clickEffect">
-                                  <p:stCondLst>
-                                    <p:cond delay="0"/>
-                                  </p:stCondLst>
-                                  <p:childTnLst>
-                                    <p:set>
-                                      <p:cBhvr>
-                                        <p:cTn id="18" dur="1" fill="hold">
-                                          <p:stCondLst>
-                                            <p:cond delay="0"/>
-                                          </p:stCondLst>
-                                        </p:cTn>
-                                        <p:tgtEl>
-                                          <p:spTgt spid="5">
-                                            <p:txEl>
-                                              <p:pRg st="6" end="6"/>
-                                            </p:txEl>
-                                          </p:spTgt>
-                                        </p:tgtEl>
-                                        <p:attrNameLst>
-                                          <p:attrName>style.visibility</p:attrName>
-                                        </p:attrNameLst>
-                                      </p:cBhvr>
-                                      <p:to>
-                                        <p:strVal val="visible"/>
-                                      </p:to>
-                                    </p:set>
-                                  </p:childTnLst>
-                                </p:cTn>
-                              </p:par>
-                              <p:par>
-                                <p:cTn id="19" presetID="1" presetClass="entr" presetSubtype="0" fill="hold" nodeType="withEffect">
-                                  <p:stCondLst>
-                                    <p:cond delay="0"/>
-                                  </p:stCondLst>
-                                  <p:childTnLst>
-                                    <p:set>
-                                      <p:cBhvr>
-                                        <p:cTn id="20" dur="1" fill="hold">
-                                          <p:stCondLst>
-                                            <p:cond delay="0"/>
-                                          </p:stCondLst>
-                                        </p:cTn>
-                                        <p:tgtEl>
-                                          <p:spTgt spid="5">
-                                            <p:txEl>
-                                              <p:pRg st="7" end="7"/>
-                                            </p:txEl>
-                                          </p:spTgt>
-                                        </p:tgtEl>
-                                        <p:attrNameLst>
-                                          <p:attrName>style.visibility</p:attrName>
-                                        </p:attrNameLst>
-                                      </p:cBhvr>
-                                      <p:to>
-                                        <p:strVal val="visible"/>
-                                      </p:to>
-                                    </p:set>
-                                  </p:childTnLst>
-                                </p:cTn>
-                              </p:par>
-                              <p:par>
-                                <p:cTn id="21" presetID="1" presetClass="entr" presetSubtype="0" fill="hold" nodeType="withEffect">
-                                  <p:stCondLst>
-                                    <p:cond delay="0"/>
-                                  </p:stCondLst>
-                                  <p:childTnLst>
-                                    <p:set>
-                                      <p:cBhvr>
-                                        <p:cTn id="22" dur="1" fill="hold">
-                                          <p:stCondLst>
-                                            <p:cond delay="0"/>
-                                          </p:stCondLst>
-                                        </p:cTn>
-                                        <p:tgtEl>
-                                          <p:spTgt spid="5">
-                                            <p:txEl>
-                                              <p:pRg st="8" end="8"/>
-                                            </p:txEl>
-                                          </p:spTgt>
-                                        </p:tgtEl>
-                                        <p:attrNameLst>
-                                          <p:attrName>style.visibility</p:attrName>
-                                        </p:attrNameLst>
-                                      </p:cBhvr>
-                                      <p:to>
-                                        <p:strVal val="visible"/>
-                                      </p:to>
-                                    </p:set>
-                                  </p:childTnLst>
-                                </p:cTn>
-                              </p:par>
-                            </p:childTnLst>
-                          </p:cTn>
-                        </p:par>
-                      </p:childTnLst>
-                    </p:cTn>
-                  </p:par>
-                  <p:par>
-                    <p:cTn id="23" fill="hold">
-                      <p:stCondLst>
-                        <p:cond delay="indefinite"/>
-                      </p:stCondLst>
-                      <p:childTnLst>
-                        <p:par>
-                          <p:cTn id="24" fill="hold">
-                            <p:stCondLst>
-                              <p:cond delay="0"/>
-                            </p:stCondLst>
-                            <p:childTnLst>
-                              <p:par>
-                                <p:cTn id="25" presetID="1" presetClass="entr" presetSubtype="0" fill="hold" nodeType="clickEffect">
-                                  <p:stCondLst>
-                                    <p:cond delay="0"/>
-                                  </p:stCondLst>
-                                  <p:childTnLst>
-                                    <p:set>
-                                      <p:cBhvr>
-                                        <p:cTn id="26" dur="1" fill="hold">
-                                          <p:stCondLst>
-                                            <p:cond delay="0"/>
-                                          </p:stCondLst>
-                                        </p:cTn>
-                                        <p:tgtEl>
-                                          <p:spTgt spid="6">
-                                            <p:txEl>
-                                              <p:pRg st="0" end="0"/>
-                                            </p:txEl>
-                                          </p:spTgt>
-                                        </p:tgtEl>
-                                        <p:attrNameLst>
-                                          <p:attrName>style.visibility</p:attrName>
-                                        </p:attrNameLst>
-                                      </p:cBhvr>
-                                      <p:to>
-                                        <p:strVal val="visible"/>
-                                      </p:to>
-                                    </p:set>
-                                  </p:childTnLst>
-                                </p:cTn>
-                              </p:par>
-                            </p:childTnLst>
-                          </p:cTn>
-                        </p:par>
-                      </p:childTnLst>
-                    </p:cTn>
-                  </p:par>
-                </p:childTnLst>
-              </p:cTn>
-              <p:prevCondLst>
-                <p:cond evt="onPrev" delay="0">
-                  <p:tgtEl>
-                    <p:sldTgt/>
-                  </p:tgtEl>
-                </p:cond>
-              </p:prevCondLst>
-              <p:nextCondLst>
-                <p:cond evt="onNext" delay="0">
-                  <p:tgtEl>
-                    <p:sldTgt/>
-                  </p:tgtEl>
-                </p:cond>
-              </p:nextCondLst>
-            </p:seq>
-          </p:childTnLst>
-        </p:cTn>
-      </p:par>
-    </p:tnLst>
-  </p:timing>
-</p:sld>
-</file>
-
 <file path=ppt/slides/slide9.xml><?xml version="1.0" encoding="utf-8"?>
 <p:sld xmlns:a="http://schemas.openxmlformats.org/drawingml/2006/main" xmlns:r="http://schemas.openxmlformats.org/officeDocument/2006/relationships" xmlns:p="http://schemas.openxmlformats.org/presentationml/2006/main">
   <p:cSld>
@@ -11547,168 +12652,105 @@
           <a:p>
             <a:r>
               <a:rPr lang="en-US" dirty="0"/>
-              <a:t>How users interact with the database</a:t>
-            </a:r>
-          </a:p>
-        </p:txBody>
-      </p:sp>
-      <p:pic>
-        <p:nvPicPr>
-          <p:cNvPr id="4" name="Picture 3"/>
-          <p:cNvPicPr>
-            <a:picLocks noChangeAspect="1"/>
-          </p:cNvPicPr>
-          <p:nvPr/>
-        </p:nvPicPr>
-        <p:blipFill>
-          <a:blip r:embed="rId2"/>
-          <a:stretch>
-            <a:fillRect/>
-          </a:stretch>
-        </p:blipFill>
-        <p:spPr>
-          <a:xfrm>
-            <a:off x="808672" y="2300761"/>
-            <a:ext cx="5591175" cy="1085850"/>
-          </a:xfrm>
-          <a:prstGeom prst="rect">
-            <a:avLst/>
-          </a:prstGeom>
-        </p:spPr>
-      </p:pic>
-      <p:pic>
-        <p:nvPicPr>
-          <p:cNvPr id="5" name="Picture 4"/>
-          <p:cNvPicPr>
-            <a:picLocks noChangeAspect="1"/>
-          </p:cNvPicPr>
-          <p:nvPr/>
-        </p:nvPicPr>
-        <p:blipFill>
-          <a:blip r:embed="rId3"/>
-          <a:stretch>
-            <a:fillRect/>
-          </a:stretch>
-        </p:blipFill>
-        <p:spPr>
-          <a:xfrm>
-            <a:off x="6829991" y="2200749"/>
-            <a:ext cx="4780817" cy="1285875"/>
-          </a:xfrm>
-          <a:prstGeom prst="rect">
-            <a:avLst/>
-          </a:prstGeom>
-        </p:spPr>
-      </p:pic>
-      <p:pic>
-        <p:nvPicPr>
-          <p:cNvPr id="6" name="Picture 5"/>
-          <p:cNvPicPr>
-            <a:picLocks noChangeAspect="1"/>
-          </p:cNvPicPr>
-          <p:nvPr/>
-        </p:nvPicPr>
-        <p:blipFill>
-          <a:blip r:embed="rId4"/>
-          <a:stretch>
-            <a:fillRect/>
-          </a:stretch>
-        </p:blipFill>
-        <p:spPr>
-          <a:xfrm>
-            <a:off x="1271587" y="3707130"/>
-            <a:ext cx="9648825" cy="2781300"/>
-          </a:xfrm>
-          <a:prstGeom prst="rect">
-            <a:avLst/>
-          </a:prstGeom>
-        </p:spPr>
-      </p:pic>
+              <a:t>SQL 101</a:t>
+            </a:r>
+          </a:p>
+        </p:txBody>
+      </p:sp>
+      <p:sp>
+        <p:nvSpPr>
+          <p:cNvPr id="3" name="Content Placeholder 2"/>
+          <p:cNvSpPr>
+            <a:spLocks noGrp="1"/>
+          </p:cNvSpPr>
+          <p:nvPr>
+            <p:ph idx="1"/>
+          </p:nvPr>
+        </p:nvSpPr>
+        <p:spPr/>
+        <p:txBody>
+          <a:bodyPr/>
+          <a:lstStyle/>
+          <a:p>
+            <a:r>
+              <a:rPr lang="en-US" dirty="0"/>
+              <a:t>Structured Query Language</a:t>
+            </a:r>
+          </a:p>
+          <a:p>
+            <a:r>
+              <a:rPr lang="en-US" dirty="0"/>
+              <a:t>Standard programming language for interacting with databases</a:t>
+            </a:r>
+          </a:p>
+          <a:p>
+            <a:r>
+              <a:rPr lang="en-US" dirty="0"/>
+              <a:t>Example Commands:</a:t>
+            </a:r>
+          </a:p>
+          <a:p>
+            <a:pPr lvl="1"/>
+            <a:r>
+              <a:rPr lang="en-US" dirty="0"/>
+              <a:t>SELECT – retrieve data</a:t>
+            </a:r>
+          </a:p>
+          <a:p>
+            <a:pPr lvl="1"/>
+            <a:r>
+              <a:rPr lang="en-US" dirty="0"/>
+              <a:t>DROP – delete table</a:t>
+            </a:r>
+          </a:p>
+          <a:p>
+            <a:pPr lvl="1"/>
+            <a:r>
+              <a:rPr lang="en-US" dirty="0"/>
+              <a:t>INSERT – add row to table</a:t>
+            </a:r>
+          </a:p>
+          <a:p>
+            <a:pPr lvl="1"/>
+            <a:r>
+              <a:rPr lang="en-US" dirty="0"/>
+              <a:t>UPDATE – modify row in a table</a:t>
+            </a:r>
+          </a:p>
+          <a:p>
+            <a:pPr lvl="1"/>
+            <a:r>
+              <a:rPr lang="en-US" dirty="0"/>
+              <a:t>DELETE – remove row from table</a:t>
+            </a:r>
+          </a:p>
+          <a:p>
+            <a:pPr lvl="1"/>
+            <a:r>
+              <a:rPr lang="en-US" dirty="0"/>
+              <a:t>-- Comments are written with a dash </a:t>
+            </a:r>
+            <a:r>
+              <a:rPr lang="en-US" dirty="0" err="1"/>
+              <a:t>dash</a:t>
+            </a:r>
+            <a:r>
+              <a:rPr lang="en-US" dirty="0"/>
+              <a:t> space in front</a:t>
+            </a:r>
+          </a:p>
+        </p:txBody>
+      </p:sp>
     </p:spTree>
     <p:extLst>
       <p:ext uri="{BB962C8B-B14F-4D97-AF65-F5344CB8AC3E}">
-        <p14:creationId xmlns:p14="http://schemas.microsoft.com/office/powerpoint/2010/main" val="2446312899"/>
+        <p14:creationId xmlns:p14="http://schemas.microsoft.com/office/powerpoint/2010/main" val="294861346"/>
       </p:ext>
     </p:extLst>
   </p:cSld>
   <p:clrMapOvr>
     <a:masterClrMapping/>
   </p:clrMapOvr>
-  <p:timing>
-    <p:tnLst>
-      <p:par>
-        <p:cTn id="1" dur="indefinite" restart="never" nodeType="tmRoot">
-          <p:childTnLst>
-            <p:seq concurrent="1" nextAc="seek">
-              <p:cTn id="2" dur="indefinite" nodeType="mainSeq">
-                <p:childTnLst>
-                  <p:par>
-                    <p:cTn id="3" fill="hold">
-                      <p:stCondLst>
-                        <p:cond delay="indefinite"/>
-                      </p:stCondLst>
-                      <p:childTnLst>
-                        <p:par>
-                          <p:cTn id="4" fill="hold">
-                            <p:stCondLst>
-                              <p:cond delay="0"/>
-                            </p:stCondLst>
-                            <p:childTnLst>
-                              <p:par>
-                                <p:cTn id="5" presetID="1" presetClass="entr" presetSubtype="0" fill="hold" nodeType="clickEffect">
-                                  <p:stCondLst>
-                                    <p:cond delay="0"/>
-                                  </p:stCondLst>
-                                  <p:childTnLst>
-                                    <p:set>
-                                      <p:cBhvr>
-                                        <p:cTn id="6" dur="1" fill="hold">
-                                          <p:stCondLst>
-                                            <p:cond delay="0"/>
-                                          </p:stCondLst>
-                                        </p:cTn>
-                                        <p:tgtEl>
-                                          <p:spTgt spid="6"/>
-                                        </p:tgtEl>
-                                        <p:attrNameLst>
-                                          <p:attrName>style.visibility</p:attrName>
-                                        </p:attrNameLst>
-                                      </p:cBhvr>
-                                      <p:to>
-                                        <p:strVal val="visible"/>
-                                      </p:to>
-                                    </p:set>
-                                  </p:childTnLst>
-                                </p:cTn>
-                              </p:par>
-                            </p:childTnLst>
-                          </p:cTn>
-                        </p:par>
-                      </p:childTnLst>
-                    </p:cTn>
-                  </p:par>
-                </p:childTnLst>
-              </p:cTn>
-              <p:prevCondLst>
-                <p:cond evt="onPrev" delay="0">
-                  <p:tgtEl>
-                    <p:sldTgt/>
-                  </p:tgtEl>
-                </p:cond>
-              </p:prevCondLst>
-              <p:nextCondLst>
-                <p:cond evt="onNext" delay="0">
-                  <p:tgtEl>
-                    <p:sldTgt/>
-                  </p:tgtEl>
-                </p:cond>
-              </p:nextCondLst>
-            </p:seq>
-          </p:childTnLst>
-        </p:cTn>
-      </p:par>
-    </p:tnLst>
-  </p:timing>
 </p:sld>
 </file>
 

</xml_diff>

<commit_message>
Update Greyhat Presentations and Coursework
</commit_message>
<xml_diff>
--- a/presentations/9-15-16_GreyHat_SQL_Injection.pptx
+++ b/presentations/9-15-16_GreyHat_SQL_Injection.pptx
@@ -10071,10 +10071,6 @@
           <a:lstStyle/>
           <a:p>
             <a:r>
-              <a:rPr lang="en-US" dirty="0"/>
-              <a:t>courtesy </a:t>
-            </a:r>
-            <a:r>
               <a:rPr lang="en-US" dirty="0" err="1"/>
               <a:t>xkcd</a:t>
             </a:r>
@@ -10083,7 +10079,15 @@
           <a:p>
             <a:r>
               <a:rPr lang="en-US" dirty="0"/>
-              <a:t>Did I really give a presentation on SQL Injection if I didn’t show you this comic?</a:t>
+              <a:t>Did I really give a presentation on </a:t>
+            </a:r>
+            <a:r>
+              <a:rPr lang="en-US" dirty="0" err="1"/>
+              <a:t>SQLi</a:t>
+            </a:r>
+            <a:r>
+              <a:rPr lang="en-US" dirty="0"/>
+              <a:t> if I didn’t show you this comic?</a:t>
             </a:r>
           </a:p>
         </p:txBody>

</xml_diff>